<commit_message>
update logic 01 and 02
</commit_message>
<xml_diff>
--- a/java/java-logic/Slide-Java-Logic-01.pptx
+++ b/java/java-logic/Slide-Java-Logic-01.pptx
@@ -1460,6 +1460,1189 @@
         </p:txBody>
       </p:sp>
     </p:spTree>
+  </p:cSld>
+  <p:clrMapOvr>
+    <a:masterClrMapping/>
+  </p:clrMapOvr>
+</p:sldLayout>
+</file>
+
+<file path=ppt/slideLayouts/slideLayout10.xml><?xml version="1.0" encoding="utf-8"?>
+<p:sldLayout xmlns:a="http://schemas.openxmlformats.org/drawingml/2006/main" xmlns:r="http://schemas.openxmlformats.org/officeDocument/2006/relationships" xmlns:p="http://schemas.openxmlformats.org/presentationml/2006/main" matchingName="Blank" preserve="1" userDrawn="1">
+  <p:cSld name="1_Blank">
+    <p:spTree>
+      <p:nvGrpSpPr>
+        <p:cNvPr id="1" name="Shape 162"/>
+        <p:cNvGrpSpPr/>
+        <p:nvPr/>
+      </p:nvGrpSpPr>
+      <p:grpSpPr>
+        <a:xfrm>
+          <a:off x="0" y="0"/>
+          <a:ext cx="0" cy="0"/>
+          <a:chOff x="0" y="0"/>
+          <a:chExt cx="0" cy="0"/>
+        </a:xfrm>
+      </p:grpSpPr>
+      <p:sp>
+        <p:nvSpPr>
+          <p:cNvPr id="163" name="Google Shape;163;p10"/>
+          <p:cNvSpPr txBox="1">
+            <a:spLocks noGrp="1"/>
+          </p:cNvSpPr>
+          <p:nvPr>
+            <p:ph type="sldNum" idx="12"/>
+          </p:nvPr>
+        </p:nvSpPr>
+        <p:spPr>
+          <a:xfrm>
+            <a:off x="7618000" y="4636500"/>
+            <a:ext cx="1487400" cy="315600"/>
+          </a:xfrm>
+          <a:prstGeom prst="rect">
+            <a:avLst/>
+          </a:prstGeom>
+        </p:spPr>
+        <p:txBody>
+          <a:bodyPr spcFirstLastPara="1" wrap="square" lIns="91425" tIns="91425" rIns="91425" bIns="91425" anchor="ctr" anchorCtr="0">
+            <a:noAutofit/>
+          </a:bodyPr>
+          <a:lstStyle>
+            <a:lvl1pPr lvl="0">
+              <a:buNone/>
+              <a:defRPr/>
+            </a:lvl1pPr>
+            <a:lvl2pPr lvl="1">
+              <a:buNone/>
+              <a:defRPr/>
+            </a:lvl2pPr>
+            <a:lvl3pPr lvl="2">
+              <a:buNone/>
+              <a:defRPr/>
+            </a:lvl3pPr>
+            <a:lvl4pPr lvl="3">
+              <a:buNone/>
+              <a:defRPr/>
+            </a:lvl4pPr>
+            <a:lvl5pPr lvl="4">
+              <a:buNone/>
+              <a:defRPr/>
+            </a:lvl5pPr>
+            <a:lvl6pPr lvl="5">
+              <a:buNone/>
+              <a:defRPr/>
+            </a:lvl6pPr>
+            <a:lvl7pPr lvl="6">
+              <a:buNone/>
+              <a:defRPr/>
+            </a:lvl7pPr>
+            <a:lvl8pPr lvl="7">
+              <a:buNone/>
+              <a:defRPr/>
+            </a:lvl8pPr>
+            <a:lvl9pPr lvl="8">
+              <a:buNone/>
+              <a:defRPr/>
+            </a:lvl9pPr>
+          </a:lstStyle>
+          <a:p>
+            <a:pPr marL="0" lvl="0" indent="0" algn="r" rtl="0">
+              <a:spcBef>
+                <a:spcPts val="0"/>
+              </a:spcBef>
+              <a:spcAft>
+                <a:spcPts val="0"/>
+              </a:spcAft>
+              <a:buNone/>
+            </a:pPr>
+            <a:fld id="{00000000-1234-1234-1234-123412341234}" type="slidenum">
+              <a:rPr lang="en"/>
+              <a:t>‹#›</a:t>
+            </a:fld>
+            <a:endParaRPr/>
+          </a:p>
+        </p:txBody>
+      </p:sp>
+      <p:grpSp>
+        <p:nvGrpSpPr>
+          <p:cNvPr id="164" name="Google Shape;164;p10"/>
+          <p:cNvGrpSpPr/>
+          <p:nvPr/>
+        </p:nvGrpSpPr>
+        <p:grpSpPr>
+          <a:xfrm>
+            <a:off x="6946842" y="4472723"/>
+            <a:ext cx="2202830" cy="670795"/>
+            <a:chOff x="5575242" y="4472723"/>
+            <a:chExt cx="2202830" cy="670795"/>
+          </a:xfrm>
+        </p:grpSpPr>
+        <p:sp>
+          <p:nvSpPr>
+            <p:cNvPr id="165" name="Google Shape;165;p10"/>
+            <p:cNvSpPr/>
+            <p:nvPr/>
+          </p:nvSpPr>
+          <p:spPr>
+            <a:xfrm rot="10800000">
+              <a:off x="5575242" y="4948334"/>
+              <a:ext cx="394200" cy="131400"/>
+            </a:xfrm>
+            <a:prstGeom prst="triangle">
+              <a:avLst>
+                <a:gd name="adj" fmla="val 32425"/>
+              </a:avLst>
+            </a:prstGeom>
+            <a:solidFill>
+              <a:srgbClr val="D26F00"/>
+            </a:solidFill>
+            <a:ln>
+              <a:noFill/>
+            </a:ln>
+          </p:spPr>
+          <p:txBody>
+            <a:bodyPr spcFirstLastPara="1" wrap="square" lIns="91425" tIns="91425" rIns="91425" bIns="91425" anchor="ctr" anchorCtr="0">
+              <a:noAutofit/>
+            </a:bodyPr>
+            <a:lstStyle/>
+            <a:p>
+              <a:pPr marL="0" lvl="0" indent="0" algn="l" rtl="0">
+                <a:spcBef>
+                  <a:spcPts val="0"/>
+                </a:spcBef>
+                <a:spcAft>
+                  <a:spcPts val="0"/>
+                </a:spcAft>
+                <a:buNone/>
+              </a:pPr>
+              <a:endParaRPr/>
+            </a:p>
+          </p:txBody>
+        </p:sp>
+        <p:grpSp>
+          <p:nvGrpSpPr>
+            <p:cNvPr id="166" name="Google Shape;166;p10"/>
+            <p:cNvGrpSpPr/>
+            <p:nvPr/>
+          </p:nvGrpSpPr>
+          <p:grpSpPr>
+            <a:xfrm flipH="1">
+              <a:off x="5734850" y="4472723"/>
+              <a:ext cx="2040837" cy="670795"/>
+              <a:chOff x="1297954" y="330075"/>
+              <a:chExt cx="5169293" cy="1699506"/>
+            </a:xfrm>
+          </p:grpSpPr>
+          <p:sp>
+            <p:nvSpPr>
+              <p:cNvPr id="167" name="Google Shape;167;p10"/>
+              <p:cNvSpPr/>
+              <p:nvPr/>
+            </p:nvSpPr>
+            <p:spPr>
+              <a:xfrm>
+                <a:off x="1297954" y="330081"/>
+                <a:ext cx="3476700" cy="1699500"/>
+              </a:xfrm>
+              <a:prstGeom prst="rect">
+                <a:avLst/>
+              </a:prstGeom>
+              <a:solidFill>
+                <a:srgbClr val="C7D3E6"/>
+              </a:solidFill>
+              <a:ln>
+                <a:noFill/>
+              </a:ln>
+            </p:spPr>
+            <p:txBody>
+              <a:bodyPr spcFirstLastPara="1" wrap="square" lIns="91425" tIns="91425" rIns="91425" bIns="91425" anchor="ctr" anchorCtr="0">
+                <a:noAutofit/>
+              </a:bodyPr>
+              <a:lstStyle/>
+              <a:p>
+                <a:pPr marL="0" lvl="0" indent="0" algn="l" rtl="0">
+                  <a:spcBef>
+                    <a:spcPts val="0"/>
+                  </a:spcBef>
+                  <a:spcAft>
+                    <a:spcPts val="0"/>
+                  </a:spcAft>
+                  <a:buNone/>
+                </a:pPr>
+                <a:endParaRPr/>
+              </a:p>
+            </p:txBody>
+          </p:sp>
+          <p:sp>
+            <p:nvSpPr>
+              <p:cNvPr id="168" name="Google Shape;168;p10"/>
+              <p:cNvSpPr/>
+              <p:nvPr/>
+            </p:nvSpPr>
+            <p:spPr>
+              <a:xfrm>
+                <a:off x="4767747" y="330075"/>
+                <a:ext cx="1699500" cy="1699500"/>
+              </a:xfrm>
+              <a:prstGeom prst="rtTriangle">
+                <a:avLst/>
+              </a:prstGeom>
+              <a:solidFill>
+                <a:srgbClr val="C7D3E6"/>
+              </a:solidFill>
+              <a:ln>
+                <a:noFill/>
+              </a:ln>
+            </p:spPr>
+            <p:txBody>
+              <a:bodyPr spcFirstLastPara="1" wrap="square" lIns="91425" tIns="91425" rIns="91425" bIns="91425" anchor="ctr" anchorCtr="0">
+                <a:noAutofit/>
+              </a:bodyPr>
+              <a:lstStyle/>
+              <a:p>
+                <a:pPr marL="0" lvl="0" indent="0" algn="l" rtl="0">
+                  <a:spcBef>
+                    <a:spcPts val="0"/>
+                  </a:spcBef>
+                  <a:spcAft>
+                    <a:spcPts val="0"/>
+                  </a:spcAft>
+                  <a:buNone/>
+                </a:pPr>
+                <a:endParaRPr/>
+              </a:p>
+            </p:txBody>
+          </p:sp>
+        </p:grpSp>
+        <p:grpSp>
+          <p:nvGrpSpPr>
+            <p:cNvPr id="169" name="Google Shape;169;p10"/>
+            <p:cNvGrpSpPr/>
+            <p:nvPr/>
+          </p:nvGrpSpPr>
+          <p:grpSpPr>
+            <a:xfrm flipH="1">
+              <a:off x="5578209" y="4646738"/>
+              <a:ext cx="2199863" cy="304563"/>
+              <a:chOff x="-5827153" y="330075"/>
+              <a:chExt cx="12276019" cy="1699569"/>
+            </a:xfrm>
+          </p:grpSpPr>
+          <p:sp>
+            <p:nvSpPr>
+              <p:cNvPr id="170" name="Google Shape;170;p10"/>
+              <p:cNvSpPr/>
+              <p:nvPr/>
+            </p:nvSpPr>
+            <p:spPr>
+              <a:xfrm>
+                <a:off x="-5827153" y="330144"/>
+                <a:ext cx="10612200" cy="1699500"/>
+              </a:xfrm>
+              <a:prstGeom prst="rect">
+                <a:avLst/>
+              </a:prstGeom>
+              <a:solidFill>
+                <a:srgbClr val="FF9800"/>
+              </a:solidFill>
+              <a:ln>
+                <a:noFill/>
+              </a:ln>
+            </p:spPr>
+            <p:txBody>
+              <a:bodyPr spcFirstLastPara="1" wrap="square" lIns="91425" tIns="91425" rIns="91425" bIns="91425" anchor="ctr" anchorCtr="0">
+                <a:noAutofit/>
+              </a:bodyPr>
+              <a:lstStyle/>
+              <a:p>
+                <a:pPr marL="0" lvl="0" indent="0" algn="l" rtl="0">
+                  <a:spcBef>
+                    <a:spcPts val="0"/>
+                  </a:spcBef>
+                  <a:spcAft>
+                    <a:spcPts val="0"/>
+                  </a:spcAft>
+                  <a:buNone/>
+                </a:pPr>
+                <a:endParaRPr/>
+              </a:p>
+            </p:txBody>
+          </p:sp>
+          <p:sp>
+            <p:nvSpPr>
+              <p:cNvPr id="171" name="Google Shape;171;p10"/>
+              <p:cNvSpPr/>
+              <p:nvPr/>
+            </p:nvSpPr>
+            <p:spPr>
+              <a:xfrm>
+                <a:off x="4749366" y="330075"/>
+                <a:ext cx="1699500" cy="1699500"/>
+              </a:xfrm>
+              <a:prstGeom prst="rtTriangle">
+                <a:avLst/>
+              </a:prstGeom>
+              <a:solidFill>
+                <a:srgbClr val="FF9800"/>
+              </a:solidFill>
+              <a:ln>
+                <a:noFill/>
+              </a:ln>
+            </p:spPr>
+            <p:txBody>
+              <a:bodyPr spcFirstLastPara="1" wrap="square" lIns="91425" tIns="91425" rIns="91425" bIns="91425" anchor="ctr" anchorCtr="0">
+                <a:noAutofit/>
+              </a:bodyPr>
+              <a:lstStyle/>
+              <a:p>
+                <a:pPr marL="0" lvl="0" indent="0" algn="l" rtl="0">
+                  <a:spcBef>
+                    <a:spcPts val="0"/>
+                  </a:spcBef>
+                  <a:spcAft>
+                    <a:spcPts val="0"/>
+                  </a:spcAft>
+                  <a:buNone/>
+                </a:pPr>
+                <a:endParaRPr/>
+              </a:p>
+            </p:txBody>
+          </p:sp>
+        </p:grpSp>
+      </p:grpSp>
+      <p:sp>
+        <p:nvSpPr>
+          <p:cNvPr id="19" name="Google Shape;79;p5">
+            <a:extLst>
+              <a:ext uri="{FF2B5EF4-FFF2-40B4-BE49-F238E27FC236}">
+                <a16:creationId xmlns:a16="http://schemas.microsoft.com/office/drawing/2014/main" id="{C158645B-7908-4698-B29A-BD4E402A9E17}"/>
+              </a:ext>
+            </a:extLst>
+          </p:cNvPr>
+          <p:cNvSpPr txBox="1">
+            <a:spLocks noGrp="1"/>
+          </p:cNvSpPr>
+          <p:nvPr>
+            <p:ph type="body" idx="1"/>
+          </p:nvPr>
+        </p:nvSpPr>
+        <p:spPr>
+          <a:xfrm>
+            <a:off x="458473" y="1634373"/>
+            <a:ext cx="3950162" cy="3012353"/>
+          </a:xfrm>
+          <a:prstGeom prst="rect">
+            <a:avLst/>
+          </a:prstGeom>
+        </p:spPr>
+        <p:txBody>
+          <a:bodyPr spcFirstLastPara="1" wrap="square" lIns="91425" tIns="91425" rIns="91425" bIns="91425" anchor="t" anchorCtr="0"/>
+          <a:lstStyle>
+            <a:lvl1pPr marL="457200" lvl="0" indent="-381000">
+              <a:spcBef>
+                <a:spcPts val="600"/>
+              </a:spcBef>
+              <a:spcAft>
+                <a:spcPts val="0"/>
+              </a:spcAft>
+              <a:buSzPts val="2400"/>
+              <a:buChar char="▰"/>
+              <a:defRPr sz="1400"/>
+            </a:lvl1pPr>
+            <a:lvl2pPr marL="914400" lvl="1" indent="-381000">
+              <a:spcBef>
+                <a:spcPts val="1000"/>
+              </a:spcBef>
+              <a:spcAft>
+                <a:spcPts val="0"/>
+              </a:spcAft>
+              <a:buSzPts val="2400"/>
+              <a:buChar char="▻"/>
+              <a:defRPr/>
+            </a:lvl2pPr>
+            <a:lvl3pPr marL="1371600" lvl="2" indent="-381000">
+              <a:spcBef>
+                <a:spcPts val="1000"/>
+              </a:spcBef>
+              <a:spcAft>
+                <a:spcPts val="0"/>
+              </a:spcAft>
+              <a:buSzPts val="2400"/>
+              <a:buChar char="▻"/>
+              <a:defRPr/>
+            </a:lvl3pPr>
+            <a:lvl4pPr marL="1828800" lvl="3" indent="-381000">
+              <a:spcBef>
+                <a:spcPts val="1000"/>
+              </a:spcBef>
+              <a:spcAft>
+                <a:spcPts val="0"/>
+              </a:spcAft>
+              <a:buSzPts val="2400"/>
+              <a:buChar char="▻"/>
+              <a:defRPr/>
+            </a:lvl4pPr>
+            <a:lvl5pPr marL="2286000" lvl="4" indent="-381000">
+              <a:spcBef>
+                <a:spcPts val="1000"/>
+              </a:spcBef>
+              <a:spcAft>
+                <a:spcPts val="0"/>
+              </a:spcAft>
+              <a:buSzPts val="2400"/>
+              <a:buChar char="▻"/>
+              <a:defRPr/>
+            </a:lvl5pPr>
+            <a:lvl6pPr marL="2743200" lvl="5" indent="-381000">
+              <a:spcBef>
+                <a:spcPts val="1000"/>
+              </a:spcBef>
+              <a:spcAft>
+                <a:spcPts val="0"/>
+              </a:spcAft>
+              <a:buSzPts val="2400"/>
+              <a:buChar char="▻"/>
+              <a:defRPr/>
+            </a:lvl6pPr>
+            <a:lvl7pPr marL="3200400" lvl="6" indent="-381000">
+              <a:spcBef>
+                <a:spcPts val="1000"/>
+              </a:spcBef>
+              <a:spcAft>
+                <a:spcPts val="0"/>
+              </a:spcAft>
+              <a:buSzPts val="2400"/>
+              <a:buChar char="▻"/>
+              <a:defRPr/>
+            </a:lvl7pPr>
+            <a:lvl8pPr marL="3657600" lvl="7" indent="-381000">
+              <a:spcBef>
+                <a:spcPts val="1000"/>
+              </a:spcBef>
+              <a:spcAft>
+                <a:spcPts val="0"/>
+              </a:spcAft>
+              <a:buSzPts val="2400"/>
+              <a:buChar char="▻"/>
+              <a:defRPr/>
+            </a:lvl8pPr>
+            <a:lvl9pPr marL="4114800" lvl="8" indent="-381000">
+              <a:spcBef>
+                <a:spcPts val="1000"/>
+              </a:spcBef>
+              <a:spcAft>
+                <a:spcPts val="1000"/>
+              </a:spcAft>
+              <a:buSzPts val="2400"/>
+              <a:buChar char="▻"/>
+              <a:defRPr/>
+            </a:lvl9pPr>
+          </a:lstStyle>
+          <a:p>
+            <a:endParaRPr dirty="0"/>
+          </a:p>
+        </p:txBody>
+      </p:sp>
+      <p:sp>
+        <p:nvSpPr>
+          <p:cNvPr id="21" name="Google Shape;79;p5">
+            <a:extLst>
+              <a:ext uri="{FF2B5EF4-FFF2-40B4-BE49-F238E27FC236}">
+                <a16:creationId xmlns:a16="http://schemas.microsoft.com/office/drawing/2014/main" id="{D187CDD8-77CC-44EC-9A35-0FF0C7AAD200}"/>
+              </a:ext>
+            </a:extLst>
+          </p:cNvPr>
+          <p:cNvSpPr txBox="1">
+            <a:spLocks noGrp="1"/>
+          </p:cNvSpPr>
+          <p:nvPr>
+            <p:ph type="body" idx="13"/>
+          </p:nvPr>
+        </p:nvSpPr>
+        <p:spPr>
+          <a:xfrm>
+            <a:off x="4772276" y="1634290"/>
+            <a:ext cx="3913252" cy="3012436"/>
+          </a:xfrm>
+          <a:prstGeom prst="rect">
+            <a:avLst/>
+          </a:prstGeom>
+        </p:spPr>
+        <p:txBody>
+          <a:bodyPr spcFirstLastPara="1" wrap="square" lIns="91425" tIns="91425" rIns="91425" bIns="91425" anchor="t" anchorCtr="0"/>
+          <a:lstStyle>
+            <a:lvl1pPr marL="457200" lvl="0" indent="-381000">
+              <a:spcBef>
+                <a:spcPts val="600"/>
+              </a:spcBef>
+              <a:spcAft>
+                <a:spcPts val="0"/>
+              </a:spcAft>
+              <a:buSzPts val="2400"/>
+              <a:buChar char="▰"/>
+              <a:defRPr sz="1400"/>
+            </a:lvl1pPr>
+            <a:lvl2pPr marL="914400" lvl="1" indent="-381000">
+              <a:spcBef>
+                <a:spcPts val="1000"/>
+              </a:spcBef>
+              <a:spcAft>
+                <a:spcPts val="0"/>
+              </a:spcAft>
+              <a:buSzPts val="2400"/>
+              <a:buChar char="▻"/>
+              <a:defRPr/>
+            </a:lvl2pPr>
+            <a:lvl3pPr marL="1371600" lvl="2" indent="-381000">
+              <a:spcBef>
+                <a:spcPts val="1000"/>
+              </a:spcBef>
+              <a:spcAft>
+                <a:spcPts val="0"/>
+              </a:spcAft>
+              <a:buSzPts val="2400"/>
+              <a:buChar char="▻"/>
+              <a:defRPr/>
+            </a:lvl3pPr>
+            <a:lvl4pPr marL="1828800" lvl="3" indent="-381000">
+              <a:spcBef>
+                <a:spcPts val="1000"/>
+              </a:spcBef>
+              <a:spcAft>
+                <a:spcPts val="0"/>
+              </a:spcAft>
+              <a:buSzPts val="2400"/>
+              <a:buChar char="▻"/>
+              <a:defRPr/>
+            </a:lvl4pPr>
+            <a:lvl5pPr marL="2286000" lvl="4" indent="-381000">
+              <a:spcBef>
+                <a:spcPts val="1000"/>
+              </a:spcBef>
+              <a:spcAft>
+                <a:spcPts val="0"/>
+              </a:spcAft>
+              <a:buSzPts val="2400"/>
+              <a:buChar char="▻"/>
+              <a:defRPr/>
+            </a:lvl5pPr>
+            <a:lvl6pPr marL="2743200" lvl="5" indent="-381000">
+              <a:spcBef>
+                <a:spcPts val="1000"/>
+              </a:spcBef>
+              <a:spcAft>
+                <a:spcPts val="0"/>
+              </a:spcAft>
+              <a:buSzPts val="2400"/>
+              <a:buChar char="▻"/>
+              <a:defRPr/>
+            </a:lvl6pPr>
+            <a:lvl7pPr marL="3200400" lvl="6" indent="-381000">
+              <a:spcBef>
+                <a:spcPts val="1000"/>
+              </a:spcBef>
+              <a:spcAft>
+                <a:spcPts val="0"/>
+              </a:spcAft>
+              <a:buSzPts val="2400"/>
+              <a:buChar char="▻"/>
+              <a:defRPr/>
+            </a:lvl7pPr>
+            <a:lvl8pPr marL="3657600" lvl="7" indent="-381000">
+              <a:spcBef>
+                <a:spcPts val="1000"/>
+              </a:spcBef>
+              <a:spcAft>
+                <a:spcPts val="0"/>
+              </a:spcAft>
+              <a:buSzPts val="2400"/>
+              <a:buChar char="▻"/>
+              <a:defRPr/>
+            </a:lvl8pPr>
+            <a:lvl9pPr marL="4114800" lvl="8" indent="-381000">
+              <a:spcBef>
+                <a:spcPts val="1000"/>
+              </a:spcBef>
+              <a:spcAft>
+                <a:spcPts val="1000"/>
+              </a:spcAft>
+              <a:buSzPts val="2400"/>
+              <a:buChar char="▻"/>
+              <a:defRPr/>
+            </a:lvl9pPr>
+          </a:lstStyle>
+          <a:p>
+            <a:endParaRPr dirty="0"/>
+          </a:p>
+        </p:txBody>
+      </p:sp>
+      <p:grpSp>
+        <p:nvGrpSpPr>
+          <p:cNvPr id="22" name="Google Shape;172;p10">
+            <a:extLst>
+              <a:ext uri="{FF2B5EF4-FFF2-40B4-BE49-F238E27FC236}">
+                <a16:creationId xmlns:a16="http://schemas.microsoft.com/office/drawing/2014/main" id="{75E22C34-0E30-4225-98FF-BF0216DB6D67}"/>
+              </a:ext>
+            </a:extLst>
+          </p:cNvPr>
+          <p:cNvGrpSpPr/>
+          <p:nvPr userDrawn="1"/>
+        </p:nvGrpSpPr>
+        <p:grpSpPr>
+          <a:xfrm rot="10800000">
+            <a:off x="-3288" y="-9"/>
+            <a:ext cx="4583250" cy="600370"/>
+            <a:chOff x="5575242" y="4472728"/>
+            <a:chExt cx="2202830" cy="670794"/>
+          </a:xfrm>
+        </p:grpSpPr>
+        <p:sp>
+          <p:nvSpPr>
+            <p:cNvPr id="23" name="Google Shape;173;p10">
+              <a:extLst>
+                <a:ext uri="{FF2B5EF4-FFF2-40B4-BE49-F238E27FC236}">
+                  <a16:creationId xmlns:a16="http://schemas.microsoft.com/office/drawing/2014/main" id="{57FC667F-3E34-4E20-9053-2A782AC27CF4}"/>
+                </a:ext>
+              </a:extLst>
+            </p:cNvPr>
+            <p:cNvSpPr/>
+            <p:nvPr/>
+          </p:nvSpPr>
+          <p:spPr>
+            <a:xfrm rot="10800000">
+              <a:off x="5575242" y="4948334"/>
+              <a:ext cx="394200" cy="131400"/>
+            </a:xfrm>
+            <a:prstGeom prst="triangle">
+              <a:avLst>
+                <a:gd name="adj" fmla="val 32425"/>
+              </a:avLst>
+            </a:prstGeom>
+            <a:solidFill>
+              <a:srgbClr val="263248"/>
+            </a:solidFill>
+            <a:ln>
+              <a:noFill/>
+            </a:ln>
+          </p:spPr>
+          <p:txBody>
+            <a:bodyPr spcFirstLastPara="1" wrap="square" lIns="91425" tIns="91425" rIns="91425" bIns="91425" anchor="ctr" anchorCtr="0">
+              <a:noAutofit/>
+            </a:bodyPr>
+            <a:lstStyle/>
+            <a:p>
+              <a:pPr marL="0" lvl="0" indent="0" algn="l" rtl="0">
+                <a:spcBef>
+                  <a:spcPts val="0"/>
+                </a:spcBef>
+                <a:spcAft>
+                  <a:spcPts val="0"/>
+                </a:spcAft>
+                <a:buNone/>
+              </a:pPr>
+              <a:endParaRPr/>
+            </a:p>
+          </p:txBody>
+        </p:sp>
+        <p:grpSp>
+          <p:nvGrpSpPr>
+            <p:cNvPr id="24" name="Google Shape;174;p10">
+              <a:extLst>
+                <a:ext uri="{FF2B5EF4-FFF2-40B4-BE49-F238E27FC236}">
+                  <a16:creationId xmlns:a16="http://schemas.microsoft.com/office/drawing/2014/main" id="{0B3BB4D6-0235-4277-8372-B15A47961DEF}"/>
+                </a:ext>
+              </a:extLst>
+            </p:cNvPr>
+            <p:cNvGrpSpPr/>
+            <p:nvPr/>
+          </p:nvGrpSpPr>
+          <p:grpSpPr>
+            <a:xfrm flipH="1">
+              <a:off x="5611893" y="4472728"/>
+              <a:ext cx="2163794" cy="670794"/>
+              <a:chOff x="1297953" y="330090"/>
+              <a:chExt cx="5480735" cy="1699502"/>
+            </a:xfrm>
+          </p:grpSpPr>
+          <p:sp>
+            <p:nvSpPr>
+              <p:cNvPr id="28" name="Google Shape;175;p10">
+                <a:extLst>
+                  <a:ext uri="{FF2B5EF4-FFF2-40B4-BE49-F238E27FC236}">
+                    <a16:creationId xmlns:a16="http://schemas.microsoft.com/office/drawing/2014/main" id="{06E96CE3-389A-41D6-AC88-391C1CD52D3D}"/>
+                  </a:ext>
+                </a:extLst>
+              </p:cNvPr>
+              <p:cNvSpPr/>
+              <p:nvPr/>
+            </p:nvSpPr>
+            <p:spPr>
+              <a:xfrm>
+                <a:off x="1297953" y="330090"/>
+                <a:ext cx="4914520" cy="1699500"/>
+              </a:xfrm>
+              <a:prstGeom prst="rect">
+                <a:avLst/>
+              </a:prstGeom>
+              <a:solidFill>
+                <a:srgbClr val="C7D3E6"/>
+              </a:solidFill>
+              <a:ln>
+                <a:noFill/>
+              </a:ln>
+            </p:spPr>
+            <p:txBody>
+              <a:bodyPr spcFirstLastPara="1" wrap="square" lIns="91425" tIns="91425" rIns="91425" bIns="91425" anchor="ctr" anchorCtr="0">
+                <a:noAutofit/>
+              </a:bodyPr>
+              <a:lstStyle/>
+              <a:p>
+                <a:pPr marL="0" lvl="0" indent="0" algn="l" rtl="0">
+                  <a:spcBef>
+                    <a:spcPts val="0"/>
+                  </a:spcBef>
+                  <a:spcAft>
+                    <a:spcPts val="0"/>
+                  </a:spcAft>
+                  <a:buNone/>
+                </a:pPr>
+                <a:endParaRPr/>
+              </a:p>
+            </p:txBody>
+          </p:sp>
+          <p:sp>
+            <p:nvSpPr>
+              <p:cNvPr id="29" name="Google Shape;176;p10">
+                <a:extLst>
+                  <a:ext uri="{FF2B5EF4-FFF2-40B4-BE49-F238E27FC236}">
+                    <a16:creationId xmlns:a16="http://schemas.microsoft.com/office/drawing/2014/main" id="{EA62C617-AFFE-4BC0-A44D-13FDB3788C2F}"/>
+                  </a:ext>
+                </a:extLst>
+              </p:cNvPr>
+              <p:cNvSpPr/>
+              <p:nvPr/>
+            </p:nvSpPr>
+            <p:spPr>
+              <a:xfrm>
+                <a:off x="6212473" y="330092"/>
+                <a:ext cx="566215" cy="1699500"/>
+              </a:xfrm>
+              <a:prstGeom prst="rtTriangle">
+                <a:avLst/>
+              </a:prstGeom>
+              <a:solidFill>
+                <a:srgbClr val="C7D3E6"/>
+              </a:solidFill>
+              <a:ln>
+                <a:noFill/>
+              </a:ln>
+            </p:spPr>
+            <p:txBody>
+              <a:bodyPr spcFirstLastPara="1" wrap="square" lIns="91425" tIns="91425" rIns="91425" bIns="91425" anchor="ctr" anchorCtr="0">
+                <a:noAutofit/>
+              </a:bodyPr>
+              <a:lstStyle/>
+              <a:p>
+                <a:pPr marL="0" lvl="0" indent="0" algn="l" rtl="0">
+                  <a:spcBef>
+                    <a:spcPts val="0"/>
+                  </a:spcBef>
+                  <a:spcAft>
+                    <a:spcPts val="0"/>
+                  </a:spcAft>
+                  <a:buNone/>
+                </a:pPr>
+                <a:endParaRPr/>
+              </a:p>
+            </p:txBody>
+          </p:sp>
+        </p:grpSp>
+        <p:grpSp>
+          <p:nvGrpSpPr>
+            <p:cNvPr id="25" name="Google Shape;177;p10">
+              <a:extLst>
+                <a:ext uri="{FF2B5EF4-FFF2-40B4-BE49-F238E27FC236}">
+                  <a16:creationId xmlns:a16="http://schemas.microsoft.com/office/drawing/2014/main" id="{7421F6D4-41AD-4407-81E9-BF4842CD211D}"/>
+                </a:ext>
+              </a:extLst>
+            </p:cNvPr>
+            <p:cNvGrpSpPr/>
+            <p:nvPr/>
+          </p:nvGrpSpPr>
+          <p:grpSpPr>
+            <a:xfrm flipH="1">
+              <a:off x="5578209" y="4646738"/>
+              <a:ext cx="2199863" cy="304566"/>
+              <a:chOff x="-5827153" y="330075"/>
+              <a:chExt cx="12276021" cy="1699582"/>
+            </a:xfrm>
+          </p:grpSpPr>
+          <p:sp>
+            <p:nvSpPr>
+              <p:cNvPr id="26" name="Google Shape;178;p10">
+                <a:extLst>
+                  <a:ext uri="{FF2B5EF4-FFF2-40B4-BE49-F238E27FC236}">
+                    <a16:creationId xmlns:a16="http://schemas.microsoft.com/office/drawing/2014/main" id="{0A43C0A8-788C-463B-895F-03E9B8220BBB}"/>
+                  </a:ext>
+                </a:extLst>
+              </p:cNvPr>
+              <p:cNvSpPr/>
+              <p:nvPr/>
+            </p:nvSpPr>
+            <p:spPr>
+              <a:xfrm>
+                <a:off x="-5827153" y="330157"/>
+                <a:ext cx="11641543" cy="1699500"/>
+              </a:xfrm>
+              <a:prstGeom prst="rect">
+                <a:avLst/>
+              </a:prstGeom>
+              <a:solidFill>
+                <a:srgbClr val="3F5378"/>
+              </a:solidFill>
+              <a:ln>
+                <a:noFill/>
+              </a:ln>
+            </p:spPr>
+            <p:txBody>
+              <a:bodyPr spcFirstLastPara="1" wrap="square" lIns="91425" tIns="91425" rIns="91425" bIns="91425" anchor="ctr" anchorCtr="0">
+                <a:noAutofit/>
+              </a:bodyPr>
+              <a:lstStyle/>
+              <a:p>
+                <a:pPr marL="0" lvl="0" indent="0" algn="l" rtl="0">
+                  <a:spcBef>
+                    <a:spcPts val="0"/>
+                  </a:spcBef>
+                  <a:spcAft>
+                    <a:spcPts val="0"/>
+                  </a:spcAft>
+                  <a:buNone/>
+                </a:pPr>
+                <a:endParaRPr/>
+              </a:p>
+            </p:txBody>
+          </p:sp>
+          <p:sp>
+            <p:nvSpPr>
+              <p:cNvPr id="27" name="Google Shape;179;p10">
+                <a:extLst>
+                  <a:ext uri="{FF2B5EF4-FFF2-40B4-BE49-F238E27FC236}">
+                    <a16:creationId xmlns:a16="http://schemas.microsoft.com/office/drawing/2014/main" id="{BAA01DF9-A09B-4CB1-A537-763DC96795F8}"/>
+                  </a:ext>
+                </a:extLst>
+              </p:cNvPr>
+              <p:cNvSpPr/>
+              <p:nvPr/>
+            </p:nvSpPr>
+            <p:spPr>
+              <a:xfrm>
+                <a:off x="5814393" y="330075"/>
+                <a:ext cx="634475" cy="1699500"/>
+              </a:xfrm>
+              <a:prstGeom prst="rtTriangle">
+                <a:avLst/>
+              </a:prstGeom>
+              <a:solidFill>
+                <a:srgbClr val="3F5378"/>
+              </a:solidFill>
+              <a:ln>
+                <a:noFill/>
+              </a:ln>
+            </p:spPr>
+            <p:txBody>
+              <a:bodyPr spcFirstLastPara="1" wrap="square" lIns="91425" tIns="91425" rIns="91425" bIns="91425" anchor="ctr" anchorCtr="0">
+                <a:noAutofit/>
+              </a:bodyPr>
+              <a:lstStyle/>
+              <a:p>
+                <a:pPr marL="0" lvl="0" indent="0" algn="l" rtl="0">
+                  <a:spcBef>
+                    <a:spcPts val="0"/>
+                  </a:spcBef>
+                  <a:spcAft>
+                    <a:spcPts val="0"/>
+                  </a:spcAft>
+                  <a:buNone/>
+                </a:pPr>
+                <a:endParaRPr/>
+              </a:p>
+            </p:txBody>
+          </p:sp>
+        </p:grpSp>
+      </p:grpSp>
+      <p:sp>
+        <p:nvSpPr>
+          <p:cNvPr id="30" name="Google Shape;98;p6">
+            <a:extLst>
+              <a:ext uri="{FF2B5EF4-FFF2-40B4-BE49-F238E27FC236}">
+                <a16:creationId xmlns:a16="http://schemas.microsoft.com/office/drawing/2014/main" id="{98711A4E-00A1-4E89-8063-A15D993ECFCD}"/>
+              </a:ext>
+            </a:extLst>
+          </p:cNvPr>
+          <p:cNvSpPr txBox="1">
+            <a:spLocks noGrp="1"/>
+          </p:cNvSpPr>
+          <p:nvPr>
+            <p:ph type="title"/>
+          </p:nvPr>
+        </p:nvSpPr>
+        <p:spPr>
+          <a:xfrm>
+            <a:off x="458472" y="186451"/>
+            <a:ext cx="3883716" cy="258157"/>
+          </a:xfrm>
+          <a:prstGeom prst="rect">
+            <a:avLst/>
+          </a:prstGeom>
+        </p:spPr>
+        <p:txBody>
+          <a:bodyPr spcFirstLastPara="1" wrap="square" lIns="91425" tIns="91425" rIns="91425" bIns="91425" anchor="ctr" anchorCtr="0"/>
+          <a:lstStyle>
+            <a:lvl1pPr lvl="0">
+              <a:spcBef>
+                <a:spcPts val="0"/>
+              </a:spcBef>
+              <a:spcAft>
+                <a:spcPts val="0"/>
+              </a:spcAft>
+              <a:buSzPts val="2000"/>
+              <a:buNone/>
+              <a:defRPr sz="1600"/>
+            </a:lvl1pPr>
+            <a:lvl2pPr lvl="1">
+              <a:spcBef>
+                <a:spcPts val="0"/>
+              </a:spcBef>
+              <a:spcAft>
+                <a:spcPts val="0"/>
+              </a:spcAft>
+              <a:buSzPts val="2000"/>
+              <a:buNone/>
+              <a:defRPr/>
+            </a:lvl2pPr>
+            <a:lvl3pPr lvl="2">
+              <a:spcBef>
+                <a:spcPts val="0"/>
+              </a:spcBef>
+              <a:spcAft>
+                <a:spcPts val="0"/>
+              </a:spcAft>
+              <a:buSzPts val="2000"/>
+              <a:buNone/>
+              <a:defRPr/>
+            </a:lvl3pPr>
+            <a:lvl4pPr lvl="3">
+              <a:spcBef>
+                <a:spcPts val="0"/>
+              </a:spcBef>
+              <a:spcAft>
+                <a:spcPts val="0"/>
+              </a:spcAft>
+              <a:buSzPts val="2000"/>
+              <a:buNone/>
+              <a:defRPr/>
+            </a:lvl4pPr>
+            <a:lvl5pPr lvl="4">
+              <a:spcBef>
+                <a:spcPts val="0"/>
+              </a:spcBef>
+              <a:spcAft>
+                <a:spcPts val="0"/>
+              </a:spcAft>
+              <a:buSzPts val="2000"/>
+              <a:buNone/>
+              <a:defRPr/>
+            </a:lvl5pPr>
+            <a:lvl6pPr lvl="5">
+              <a:spcBef>
+                <a:spcPts val="0"/>
+              </a:spcBef>
+              <a:spcAft>
+                <a:spcPts val="0"/>
+              </a:spcAft>
+              <a:buSzPts val="2000"/>
+              <a:buNone/>
+              <a:defRPr/>
+            </a:lvl6pPr>
+            <a:lvl7pPr lvl="6">
+              <a:spcBef>
+                <a:spcPts val="0"/>
+              </a:spcBef>
+              <a:spcAft>
+                <a:spcPts val="0"/>
+              </a:spcAft>
+              <a:buSzPts val="2000"/>
+              <a:buNone/>
+              <a:defRPr/>
+            </a:lvl7pPr>
+            <a:lvl8pPr lvl="7">
+              <a:spcBef>
+                <a:spcPts val="0"/>
+              </a:spcBef>
+              <a:spcAft>
+                <a:spcPts val="0"/>
+              </a:spcAft>
+              <a:buSzPts val="2000"/>
+              <a:buNone/>
+              <a:defRPr/>
+            </a:lvl8pPr>
+            <a:lvl9pPr lvl="8">
+              <a:spcBef>
+                <a:spcPts val="0"/>
+              </a:spcBef>
+              <a:spcAft>
+                <a:spcPts val="0"/>
+              </a:spcAft>
+              <a:buSzPts val="2000"/>
+              <a:buNone/>
+              <a:defRPr/>
+            </a:lvl9pPr>
+          </a:lstStyle>
+          <a:p>
+            <a:endParaRPr dirty="0"/>
+          </a:p>
+        </p:txBody>
+      </p:sp>
+      <p:sp>
+        <p:nvSpPr>
+          <p:cNvPr id="31" name="Google Shape;79;p5">
+            <a:extLst>
+              <a:ext uri="{FF2B5EF4-FFF2-40B4-BE49-F238E27FC236}">
+                <a16:creationId xmlns:a16="http://schemas.microsoft.com/office/drawing/2014/main" id="{7408B06A-A607-416C-8836-2D7C1A9516C1}"/>
+              </a:ext>
+            </a:extLst>
+          </p:cNvPr>
+          <p:cNvSpPr txBox="1">
+            <a:spLocks noGrp="1"/>
+          </p:cNvSpPr>
+          <p:nvPr>
+            <p:ph type="body" idx="14"/>
+          </p:nvPr>
+        </p:nvSpPr>
+        <p:spPr>
+          <a:xfrm>
+            <a:off x="461244" y="618719"/>
+            <a:ext cx="8224284" cy="841556"/>
+          </a:xfrm>
+          <a:prstGeom prst="rect">
+            <a:avLst/>
+          </a:prstGeom>
+        </p:spPr>
+        <p:txBody>
+          <a:bodyPr spcFirstLastPara="1" wrap="square" lIns="91425" tIns="91425" rIns="91425" bIns="91425" anchor="t" anchorCtr="0"/>
+          <a:lstStyle>
+            <a:lvl1pPr marL="457200" lvl="0" indent="-381000">
+              <a:spcBef>
+                <a:spcPts val="600"/>
+              </a:spcBef>
+              <a:spcAft>
+                <a:spcPts val="0"/>
+              </a:spcAft>
+              <a:buSzPts val="2400"/>
+              <a:buChar char="▰"/>
+              <a:defRPr sz="1400"/>
+            </a:lvl1pPr>
+            <a:lvl2pPr marL="914400" lvl="1" indent="-381000">
+              <a:spcBef>
+                <a:spcPts val="1000"/>
+              </a:spcBef>
+              <a:spcAft>
+                <a:spcPts val="0"/>
+              </a:spcAft>
+              <a:buSzPts val="2400"/>
+              <a:buChar char="▻"/>
+              <a:defRPr/>
+            </a:lvl2pPr>
+            <a:lvl3pPr marL="1371600" lvl="2" indent="-381000">
+              <a:spcBef>
+                <a:spcPts val="1000"/>
+              </a:spcBef>
+              <a:spcAft>
+                <a:spcPts val="0"/>
+              </a:spcAft>
+              <a:buSzPts val="2400"/>
+              <a:buChar char="▻"/>
+              <a:defRPr/>
+            </a:lvl3pPr>
+            <a:lvl4pPr marL="1828800" lvl="3" indent="-381000">
+              <a:spcBef>
+                <a:spcPts val="1000"/>
+              </a:spcBef>
+              <a:spcAft>
+                <a:spcPts val="0"/>
+              </a:spcAft>
+              <a:buSzPts val="2400"/>
+              <a:buChar char="▻"/>
+              <a:defRPr/>
+            </a:lvl4pPr>
+            <a:lvl5pPr marL="2286000" lvl="4" indent="-381000">
+              <a:spcBef>
+                <a:spcPts val="1000"/>
+              </a:spcBef>
+              <a:spcAft>
+                <a:spcPts val="0"/>
+              </a:spcAft>
+              <a:buSzPts val="2400"/>
+              <a:buChar char="▻"/>
+              <a:defRPr/>
+            </a:lvl5pPr>
+            <a:lvl6pPr marL="2743200" lvl="5" indent="-381000">
+              <a:spcBef>
+                <a:spcPts val="1000"/>
+              </a:spcBef>
+              <a:spcAft>
+                <a:spcPts val="0"/>
+              </a:spcAft>
+              <a:buSzPts val="2400"/>
+              <a:buChar char="▻"/>
+              <a:defRPr/>
+            </a:lvl6pPr>
+            <a:lvl7pPr marL="3200400" lvl="6" indent="-381000">
+              <a:spcBef>
+                <a:spcPts val="1000"/>
+              </a:spcBef>
+              <a:spcAft>
+                <a:spcPts val="0"/>
+              </a:spcAft>
+              <a:buSzPts val="2400"/>
+              <a:buChar char="▻"/>
+              <a:defRPr/>
+            </a:lvl7pPr>
+            <a:lvl8pPr marL="3657600" lvl="7" indent="-381000">
+              <a:spcBef>
+                <a:spcPts val="1000"/>
+              </a:spcBef>
+              <a:spcAft>
+                <a:spcPts val="0"/>
+              </a:spcAft>
+              <a:buSzPts val="2400"/>
+              <a:buChar char="▻"/>
+              <a:defRPr/>
+            </a:lvl8pPr>
+            <a:lvl9pPr marL="4114800" lvl="8" indent="-381000">
+              <a:spcBef>
+                <a:spcPts val="1000"/>
+              </a:spcBef>
+              <a:spcAft>
+                <a:spcPts val="1000"/>
+              </a:spcAft>
+              <a:buSzPts val="2400"/>
+              <a:buChar char="▻"/>
+              <a:defRPr/>
+            </a:lvl9pPr>
+          </a:lstStyle>
+          <a:p>
+            <a:endParaRPr dirty="0"/>
+          </a:p>
+        </p:txBody>
+      </p:sp>
+    </p:spTree>
+    <p:extLst>
+      <p:ext uri="{BB962C8B-B14F-4D97-AF65-F5344CB8AC3E}">
+        <p14:creationId xmlns:p14="http://schemas.microsoft.com/office/powerpoint/2010/main" val="4011867848"/>
+      </p:ext>
+    </p:extLst>
   </p:cSld>
   <p:clrMapOvr>
     <a:masterClrMapping/>
@@ -4274,6 +5457,1015 @@
 </file>
 
 <file path=ppt/slideLayouts/slideLayout5.xml><?xml version="1.0" encoding="utf-8"?>
+<p:sldLayout xmlns:a="http://schemas.openxmlformats.org/drawingml/2006/main" xmlns:r="http://schemas.openxmlformats.org/officeDocument/2006/relationships" xmlns:p="http://schemas.openxmlformats.org/presentationml/2006/main" matchingName="Title + 2 columns" type="twoColTx" preserve="1">
+  <p:cSld name="1_Title + 2 columns">
+    <p:spTree>
+      <p:nvGrpSpPr>
+        <p:cNvPr id="1" name="Shape 81"/>
+        <p:cNvGrpSpPr/>
+        <p:nvPr/>
+      </p:nvGrpSpPr>
+      <p:grpSpPr>
+        <a:xfrm>
+          <a:off x="0" y="0"/>
+          <a:ext cx="0" cy="0"/>
+          <a:chOff x="0" y="0"/>
+          <a:chExt cx="0" cy="0"/>
+        </a:xfrm>
+      </p:grpSpPr>
+      <p:grpSp>
+        <p:nvGrpSpPr>
+          <p:cNvPr id="82" name="Google Shape;82;p6"/>
+          <p:cNvGrpSpPr/>
+          <p:nvPr/>
+        </p:nvGrpSpPr>
+        <p:grpSpPr>
+          <a:xfrm>
+            <a:off x="-5" y="41"/>
+            <a:ext cx="6019805" cy="971509"/>
+            <a:chOff x="-4" y="40"/>
+            <a:chExt cx="7072430" cy="1327315"/>
+          </a:xfrm>
+        </p:grpSpPr>
+        <p:sp>
+          <p:nvSpPr>
+            <p:cNvPr id="83" name="Google Shape;83;p6"/>
+            <p:cNvSpPr/>
+            <p:nvPr/>
+          </p:nvSpPr>
+          <p:spPr>
+            <a:xfrm>
+              <a:off x="6292649" y="126425"/>
+              <a:ext cx="779700" cy="259800"/>
+            </a:xfrm>
+            <a:prstGeom prst="triangle">
+              <a:avLst>
+                <a:gd name="adj" fmla="val 32425"/>
+              </a:avLst>
+            </a:prstGeom>
+            <a:solidFill>
+              <a:srgbClr val="263248"/>
+            </a:solidFill>
+            <a:ln>
+              <a:noFill/>
+            </a:ln>
+          </p:spPr>
+          <p:txBody>
+            <a:bodyPr spcFirstLastPara="1" wrap="square" lIns="91425" tIns="91425" rIns="91425" bIns="91425" anchor="ctr" anchorCtr="0">
+              <a:noAutofit/>
+            </a:bodyPr>
+            <a:lstStyle/>
+            <a:p>
+              <a:pPr marL="0" lvl="0" indent="0" algn="l" rtl="0">
+                <a:spcBef>
+                  <a:spcPts val="0"/>
+                </a:spcBef>
+                <a:spcAft>
+                  <a:spcPts val="0"/>
+                </a:spcAft>
+                <a:buNone/>
+              </a:pPr>
+              <a:endParaRPr>
+                <a:latin typeface="Arvo"/>
+                <a:ea typeface="Arvo"/>
+                <a:cs typeface="Arvo"/>
+                <a:sym typeface="Arvo"/>
+              </a:endParaRPr>
+            </a:p>
+          </p:txBody>
+        </p:sp>
+        <p:grpSp>
+          <p:nvGrpSpPr>
+            <p:cNvPr id="84" name="Google Shape;84;p6"/>
+            <p:cNvGrpSpPr/>
+            <p:nvPr/>
+          </p:nvGrpSpPr>
+          <p:grpSpPr>
+            <a:xfrm rot="10800000" flipH="1">
+              <a:off x="3" y="40"/>
+              <a:ext cx="6756167" cy="1327315"/>
+              <a:chOff x="-2168138" y="330075"/>
+              <a:chExt cx="8650662" cy="1699506"/>
+            </a:xfrm>
+          </p:grpSpPr>
+          <p:sp>
+            <p:nvSpPr>
+              <p:cNvPr id="85" name="Google Shape;85;p6"/>
+              <p:cNvSpPr/>
+              <p:nvPr/>
+            </p:nvSpPr>
+            <p:spPr>
+              <a:xfrm>
+                <a:off x="-2168138" y="330080"/>
+                <a:ext cx="7680065" cy="1699501"/>
+              </a:xfrm>
+              <a:prstGeom prst="rect">
+                <a:avLst/>
+              </a:prstGeom>
+              <a:solidFill>
+                <a:srgbClr val="C7D3E6"/>
+              </a:solidFill>
+              <a:ln>
+                <a:noFill/>
+              </a:ln>
+            </p:spPr>
+            <p:txBody>
+              <a:bodyPr spcFirstLastPara="1" wrap="square" lIns="91425" tIns="91425" rIns="91425" bIns="91425" anchor="ctr" anchorCtr="0">
+                <a:noAutofit/>
+              </a:bodyPr>
+              <a:lstStyle/>
+              <a:p>
+                <a:pPr marL="0" lvl="0" indent="0" algn="l" rtl="0">
+                  <a:spcBef>
+                    <a:spcPts val="0"/>
+                  </a:spcBef>
+                  <a:spcAft>
+                    <a:spcPts val="0"/>
+                  </a:spcAft>
+                  <a:buNone/>
+                </a:pPr>
+                <a:endParaRPr>
+                  <a:latin typeface="Arvo"/>
+                  <a:ea typeface="Arvo"/>
+                  <a:cs typeface="Arvo"/>
+                  <a:sym typeface="Arvo"/>
+                </a:endParaRPr>
+              </a:p>
+            </p:txBody>
+          </p:sp>
+          <p:sp>
+            <p:nvSpPr>
+              <p:cNvPr id="86" name="Google Shape;86;p6"/>
+              <p:cNvSpPr/>
+              <p:nvPr/>
+            </p:nvSpPr>
+            <p:spPr>
+              <a:xfrm>
+                <a:off x="5511927" y="330075"/>
+                <a:ext cx="970597" cy="1699501"/>
+              </a:xfrm>
+              <a:prstGeom prst="rtTriangle">
+                <a:avLst/>
+              </a:prstGeom>
+              <a:solidFill>
+                <a:srgbClr val="C7D3E6"/>
+              </a:solidFill>
+              <a:ln>
+                <a:noFill/>
+              </a:ln>
+            </p:spPr>
+            <p:txBody>
+              <a:bodyPr spcFirstLastPara="1" wrap="square" lIns="91425" tIns="91425" rIns="91425" bIns="91425" anchor="ctr" anchorCtr="0">
+                <a:noAutofit/>
+              </a:bodyPr>
+              <a:lstStyle/>
+              <a:p>
+                <a:pPr marL="0" lvl="0" indent="0" algn="l" rtl="0">
+                  <a:spcBef>
+                    <a:spcPts val="0"/>
+                  </a:spcBef>
+                  <a:spcAft>
+                    <a:spcPts val="0"/>
+                  </a:spcAft>
+                  <a:buNone/>
+                </a:pPr>
+                <a:endParaRPr>
+                  <a:latin typeface="Arvo"/>
+                  <a:ea typeface="Arvo"/>
+                  <a:cs typeface="Arvo"/>
+                  <a:sym typeface="Arvo"/>
+                </a:endParaRPr>
+              </a:p>
+            </p:txBody>
+          </p:sp>
+        </p:grpSp>
+        <p:grpSp>
+          <p:nvGrpSpPr>
+            <p:cNvPr id="87" name="Google Shape;87;p6"/>
+            <p:cNvGrpSpPr/>
+            <p:nvPr/>
+          </p:nvGrpSpPr>
+          <p:grpSpPr>
+            <a:xfrm rot="10800000" flipH="1">
+              <a:off x="-4" y="381004"/>
+              <a:ext cx="7072430" cy="771745"/>
+              <a:chOff x="-9092084" y="330081"/>
+              <a:chExt cx="15574609" cy="1699504"/>
+            </a:xfrm>
+          </p:grpSpPr>
+          <p:sp>
+            <p:nvSpPr>
+              <p:cNvPr id="88" name="Google Shape;88;p6"/>
+              <p:cNvSpPr/>
+              <p:nvPr/>
+            </p:nvSpPr>
+            <p:spPr>
+              <a:xfrm>
+                <a:off x="-9092084" y="330084"/>
+                <a:ext cx="14391555" cy="1699501"/>
+              </a:xfrm>
+              <a:prstGeom prst="rect">
+                <a:avLst/>
+              </a:prstGeom>
+              <a:solidFill>
+                <a:srgbClr val="3F5378"/>
+              </a:solidFill>
+              <a:ln>
+                <a:noFill/>
+              </a:ln>
+            </p:spPr>
+            <p:txBody>
+              <a:bodyPr spcFirstLastPara="1" wrap="square" lIns="91425" tIns="91425" rIns="91425" bIns="91425" anchor="ctr" anchorCtr="0">
+                <a:noAutofit/>
+              </a:bodyPr>
+              <a:lstStyle/>
+              <a:p>
+                <a:pPr marL="0" lvl="0" indent="0" algn="l" rtl="0">
+                  <a:spcBef>
+                    <a:spcPts val="0"/>
+                  </a:spcBef>
+                  <a:spcAft>
+                    <a:spcPts val="0"/>
+                  </a:spcAft>
+                  <a:buNone/>
+                </a:pPr>
+                <a:endParaRPr>
+                  <a:latin typeface="Arvo"/>
+                  <a:ea typeface="Arvo"/>
+                  <a:cs typeface="Arvo"/>
+                  <a:sym typeface="Arvo"/>
+                </a:endParaRPr>
+              </a:p>
+            </p:txBody>
+          </p:sp>
+          <p:sp>
+            <p:nvSpPr>
+              <p:cNvPr id="89" name="Google Shape;89;p6"/>
+              <p:cNvSpPr/>
+              <p:nvPr/>
+            </p:nvSpPr>
+            <p:spPr>
+              <a:xfrm>
+                <a:off x="5299642" y="330081"/>
+                <a:ext cx="1182883" cy="1699501"/>
+              </a:xfrm>
+              <a:prstGeom prst="rtTriangle">
+                <a:avLst/>
+              </a:prstGeom>
+              <a:solidFill>
+                <a:srgbClr val="3F5378"/>
+              </a:solidFill>
+              <a:ln>
+                <a:noFill/>
+              </a:ln>
+            </p:spPr>
+            <p:txBody>
+              <a:bodyPr spcFirstLastPara="1" wrap="square" lIns="91425" tIns="91425" rIns="91425" bIns="91425" anchor="ctr" anchorCtr="0">
+                <a:noAutofit/>
+              </a:bodyPr>
+              <a:lstStyle/>
+              <a:p>
+                <a:pPr marL="0" lvl="0" indent="0" algn="l" rtl="0">
+                  <a:spcBef>
+                    <a:spcPts val="0"/>
+                  </a:spcBef>
+                  <a:spcAft>
+                    <a:spcPts val="0"/>
+                  </a:spcAft>
+                  <a:buNone/>
+                </a:pPr>
+                <a:endParaRPr>
+                  <a:latin typeface="Arvo"/>
+                  <a:ea typeface="Arvo"/>
+                  <a:cs typeface="Arvo"/>
+                  <a:sym typeface="Arvo"/>
+                </a:endParaRPr>
+              </a:p>
+            </p:txBody>
+          </p:sp>
+        </p:grpSp>
+      </p:grpSp>
+      <p:grpSp>
+        <p:nvGrpSpPr>
+          <p:cNvPr id="90" name="Google Shape;90;p6"/>
+          <p:cNvGrpSpPr/>
+          <p:nvPr/>
+        </p:nvGrpSpPr>
+        <p:grpSpPr>
+          <a:xfrm>
+            <a:off x="6946842" y="4472723"/>
+            <a:ext cx="2202830" cy="670795"/>
+            <a:chOff x="5575242" y="4472723"/>
+            <a:chExt cx="2202830" cy="670795"/>
+          </a:xfrm>
+        </p:grpSpPr>
+        <p:sp>
+          <p:nvSpPr>
+            <p:cNvPr id="91" name="Google Shape;91;p6"/>
+            <p:cNvSpPr/>
+            <p:nvPr/>
+          </p:nvSpPr>
+          <p:spPr>
+            <a:xfrm rot="10800000">
+              <a:off x="5575242" y="4948334"/>
+              <a:ext cx="394200" cy="131400"/>
+            </a:xfrm>
+            <a:prstGeom prst="triangle">
+              <a:avLst>
+                <a:gd name="adj" fmla="val 32425"/>
+              </a:avLst>
+            </a:prstGeom>
+            <a:solidFill>
+              <a:srgbClr val="D26F00"/>
+            </a:solidFill>
+            <a:ln>
+              <a:noFill/>
+            </a:ln>
+          </p:spPr>
+          <p:txBody>
+            <a:bodyPr spcFirstLastPara="1" wrap="square" lIns="91425" tIns="91425" rIns="91425" bIns="91425" anchor="ctr" anchorCtr="0">
+              <a:noAutofit/>
+            </a:bodyPr>
+            <a:lstStyle/>
+            <a:p>
+              <a:pPr marL="0" lvl="0" indent="0" algn="l" rtl="0">
+                <a:spcBef>
+                  <a:spcPts val="0"/>
+                </a:spcBef>
+                <a:spcAft>
+                  <a:spcPts val="0"/>
+                </a:spcAft>
+                <a:buNone/>
+              </a:pPr>
+              <a:endParaRPr/>
+            </a:p>
+          </p:txBody>
+        </p:sp>
+        <p:grpSp>
+          <p:nvGrpSpPr>
+            <p:cNvPr id="92" name="Google Shape;92;p6"/>
+            <p:cNvGrpSpPr/>
+            <p:nvPr/>
+          </p:nvGrpSpPr>
+          <p:grpSpPr>
+            <a:xfrm flipH="1">
+              <a:off x="5734850" y="4472723"/>
+              <a:ext cx="2040837" cy="670795"/>
+              <a:chOff x="1297954" y="330075"/>
+              <a:chExt cx="5169293" cy="1699506"/>
+            </a:xfrm>
+          </p:grpSpPr>
+          <p:sp>
+            <p:nvSpPr>
+              <p:cNvPr id="93" name="Google Shape;93;p6"/>
+              <p:cNvSpPr/>
+              <p:nvPr/>
+            </p:nvSpPr>
+            <p:spPr>
+              <a:xfrm>
+                <a:off x="1297954" y="330081"/>
+                <a:ext cx="3476700" cy="1699500"/>
+              </a:xfrm>
+              <a:prstGeom prst="rect">
+                <a:avLst/>
+              </a:prstGeom>
+              <a:solidFill>
+                <a:srgbClr val="C7D3E6"/>
+              </a:solidFill>
+              <a:ln>
+                <a:noFill/>
+              </a:ln>
+            </p:spPr>
+            <p:txBody>
+              <a:bodyPr spcFirstLastPara="1" wrap="square" lIns="91425" tIns="91425" rIns="91425" bIns="91425" anchor="ctr" anchorCtr="0">
+                <a:noAutofit/>
+              </a:bodyPr>
+              <a:lstStyle/>
+              <a:p>
+                <a:pPr marL="0" lvl="0" indent="0" algn="l" rtl="0">
+                  <a:spcBef>
+                    <a:spcPts val="0"/>
+                  </a:spcBef>
+                  <a:spcAft>
+                    <a:spcPts val="0"/>
+                  </a:spcAft>
+                  <a:buNone/>
+                </a:pPr>
+                <a:endParaRPr/>
+              </a:p>
+            </p:txBody>
+          </p:sp>
+          <p:sp>
+            <p:nvSpPr>
+              <p:cNvPr id="94" name="Google Shape;94;p6"/>
+              <p:cNvSpPr/>
+              <p:nvPr/>
+            </p:nvSpPr>
+            <p:spPr>
+              <a:xfrm>
+                <a:off x="4767747" y="330075"/>
+                <a:ext cx="1699500" cy="1699500"/>
+              </a:xfrm>
+              <a:prstGeom prst="rtTriangle">
+                <a:avLst/>
+              </a:prstGeom>
+              <a:solidFill>
+                <a:srgbClr val="C7D3E6"/>
+              </a:solidFill>
+              <a:ln>
+                <a:noFill/>
+              </a:ln>
+            </p:spPr>
+            <p:txBody>
+              <a:bodyPr spcFirstLastPara="1" wrap="square" lIns="91425" tIns="91425" rIns="91425" bIns="91425" anchor="ctr" anchorCtr="0">
+                <a:noAutofit/>
+              </a:bodyPr>
+              <a:lstStyle/>
+              <a:p>
+                <a:pPr marL="0" lvl="0" indent="0" algn="l" rtl="0">
+                  <a:spcBef>
+                    <a:spcPts val="0"/>
+                  </a:spcBef>
+                  <a:spcAft>
+                    <a:spcPts val="0"/>
+                  </a:spcAft>
+                  <a:buNone/>
+                </a:pPr>
+                <a:endParaRPr/>
+              </a:p>
+            </p:txBody>
+          </p:sp>
+        </p:grpSp>
+        <p:grpSp>
+          <p:nvGrpSpPr>
+            <p:cNvPr id="95" name="Google Shape;95;p6"/>
+            <p:cNvGrpSpPr/>
+            <p:nvPr/>
+          </p:nvGrpSpPr>
+          <p:grpSpPr>
+            <a:xfrm flipH="1">
+              <a:off x="5578209" y="4646738"/>
+              <a:ext cx="2199863" cy="304563"/>
+              <a:chOff x="-5827153" y="330075"/>
+              <a:chExt cx="12276019" cy="1699569"/>
+            </a:xfrm>
+          </p:grpSpPr>
+          <p:sp>
+            <p:nvSpPr>
+              <p:cNvPr id="96" name="Google Shape;96;p6"/>
+              <p:cNvSpPr/>
+              <p:nvPr/>
+            </p:nvSpPr>
+            <p:spPr>
+              <a:xfrm>
+                <a:off x="-5827153" y="330144"/>
+                <a:ext cx="10612200" cy="1699500"/>
+              </a:xfrm>
+              <a:prstGeom prst="rect">
+                <a:avLst/>
+              </a:prstGeom>
+              <a:solidFill>
+                <a:srgbClr val="FF9800"/>
+              </a:solidFill>
+              <a:ln>
+                <a:noFill/>
+              </a:ln>
+            </p:spPr>
+            <p:txBody>
+              <a:bodyPr spcFirstLastPara="1" wrap="square" lIns="91425" tIns="91425" rIns="91425" bIns="91425" anchor="ctr" anchorCtr="0">
+                <a:noAutofit/>
+              </a:bodyPr>
+              <a:lstStyle/>
+              <a:p>
+                <a:pPr marL="0" lvl="0" indent="0" algn="l" rtl="0">
+                  <a:spcBef>
+                    <a:spcPts val="0"/>
+                  </a:spcBef>
+                  <a:spcAft>
+                    <a:spcPts val="0"/>
+                  </a:spcAft>
+                  <a:buNone/>
+                </a:pPr>
+                <a:endParaRPr/>
+              </a:p>
+            </p:txBody>
+          </p:sp>
+          <p:sp>
+            <p:nvSpPr>
+              <p:cNvPr id="97" name="Google Shape;97;p6"/>
+              <p:cNvSpPr/>
+              <p:nvPr/>
+            </p:nvSpPr>
+            <p:spPr>
+              <a:xfrm>
+                <a:off x="4749366" y="330075"/>
+                <a:ext cx="1699500" cy="1699500"/>
+              </a:xfrm>
+              <a:prstGeom prst="rtTriangle">
+                <a:avLst/>
+              </a:prstGeom>
+              <a:solidFill>
+                <a:srgbClr val="FF9800"/>
+              </a:solidFill>
+              <a:ln>
+                <a:noFill/>
+              </a:ln>
+            </p:spPr>
+            <p:txBody>
+              <a:bodyPr spcFirstLastPara="1" wrap="square" lIns="91425" tIns="91425" rIns="91425" bIns="91425" anchor="ctr" anchorCtr="0">
+                <a:noAutofit/>
+              </a:bodyPr>
+              <a:lstStyle/>
+              <a:p>
+                <a:pPr marL="0" lvl="0" indent="0" algn="l" rtl="0">
+                  <a:spcBef>
+                    <a:spcPts val="0"/>
+                  </a:spcBef>
+                  <a:spcAft>
+                    <a:spcPts val="0"/>
+                  </a:spcAft>
+                  <a:buNone/>
+                </a:pPr>
+                <a:endParaRPr/>
+              </a:p>
+            </p:txBody>
+          </p:sp>
+        </p:grpSp>
+      </p:grpSp>
+      <p:sp>
+        <p:nvSpPr>
+          <p:cNvPr id="98" name="Google Shape;98;p6"/>
+          <p:cNvSpPr txBox="1">
+            <a:spLocks noGrp="1"/>
+          </p:cNvSpPr>
+          <p:nvPr>
+            <p:ph type="title"/>
+          </p:nvPr>
+        </p:nvSpPr>
+        <p:spPr>
+          <a:xfrm>
+            <a:off x="457201" y="278883"/>
+            <a:ext cx="4191000" cy="573059"/>
+          </a:xfrm>
+          <a:prstGeom prst="rect">
+            <a:avLst/>
+          </a:prstGeom>
+        </p:spPr>
+        <p:txBody>
+          <a:bodyPr spcFirstLastPara="1" wrap="square" lIns="91425" tIns="91425" rIns="91425" bIns="91425" anchor="ctr" anchorCtr="0"/>
+          <a:lstStyle>
+            <a:lvl1pPr lvl="0">
+              <a:spcBef>
+                <a:spcPts val="0"/>
+              </a:spcBef>
+              <a:spcAft>
+                <a:spcPts val="0"/>
+              </a:spcAft>
+              <a:buSzPts val="2000"/>
+              <a:buNone/>
+              <a:defRPr/>
+            </a:lvl1pPr>
+            <a:lvl2pPr lvl="1">
+              <a:spcBef>
+                <a:spcPts val="0"/>
+              </a:spcBef>
+              <a:spcAft>
+                <a:spcPts val="0"/>
+              </a:spcAft>
+              <a:buSzPts val="2000"/>
+              <a:buNone/>
+              <a:defRPr/>
+            </a:lvl2pPr>
+            <a:lvl3pPr lvl="2">
+              <a:spcBef>
+                <a:spcPts val="0"/>
+              </a:spcBef>
+              <a:spcAft>
+                <a:spcPts val="0"/>
+              </a:spcAft>
+              <a:buSzPts val="2000"/>
+              <a:buNone/>
+              <a:defRPr/>
+            </a:lvl3pPr>
+            <a:lvl4pPr lvl="3">
+              <a:spcBef>
+                <a:spcPts val="0"/>
+              </a:spcBef>
+              <a:spcAft>
+                <a:spcPts val="0"/>
+              </a:spcAft>
+              <a:buSzPts val="2000"/>
+              <a:buNone/>
+              <a:defRPr/>
+            </a:lvl4pPr>
+            <a:lvl5pPr lvl="4">
+              <a:spcBef>
+                <a:spcPts val="0"/>
+              </a:spcBef>
+              <a:spcAft>
+                <a:spcPts val="0"/>
+              </a:spcAft>
+              <a:buSzPts val="2000"/>
+              <a:buNone/>
+              <a:defRPr/>
+            </a:lvl5pPr>
+            <a:lvl6pPr lvl="5">
+              <a:spcBef>
+                <a:spcPts val="0"/>
+              </a:spcBef>
+              <a:spcAft>
+                <a:spcPts val="0"/>
+              </a:spcAft>
+              <a:buSzPts val="2000"/>
+              <a:buNone/>
+              <a:defRPr/>
+            </a:lvl6pPr>
+            <a:lvl7pPr lvl="6">
+              <a:spcBef>
+                <a:spcPts val="0"/>
+              </a:spcBef>
+              <a:spcAft>
+                <a:spcPts val="0"/>
+              </a:spcAft>
+              <a:buSzPts val="2000"/>
+              <a:buNone/>
+              <a:defRPr/>
+            </a:lvl7pPr>
+            <a:lvl8pPr lvl="7">
+              <a:spcBef>
+                <a:spcPts val="0"/>
+              </a:spcBef>
+              <a:spcAft>
+                <a:spcPts val="0"/>
+              </a:spcAft>
+              <a:buSzPts val="2000"/>
+              <a:buNone/>
+              <a:defRPr/>
+            </a:lvl8pPr>
+            <a:lvl9pPr lvl="8">
+              <a:spcBef>
+                <a:spcPts val="0"/>
+              </a:spcBef>
+              <a:spcAft>
+                <a:spcPts val="0"/>
+              </a:spcAft>
+              <a:buSzPts val="2000"/>
+              <a:buNone/>
+              <a:defRPr/>
+            </a:lvl9pPr>
+          </a:lstStyle>
+          <a:p>
+            <a:endParaRPr dirty="0"/>
+          </a:p>
+        </p:txBody>
+      </p:sp>
+      <p:sp>
+        <p:nvSpPr>
+          <p:cNvPr id="99" name="Google Shape;99;p6"/>
+          <p:cNvSpPr txBox="1">
+            <a:spLocks noGrp="1"/>
+          </p:cNvSpPr>
+          <p:nvPr>
+            <p:ph type="body" idx="1"/>
+          </p:nvPr>
+        </p:nvSpPr>
+        <p:spPr>
+          <a:xfrm>
+            <a:off x="457200" y="1157884"/>
+            <a:ext cx="3924799" cy="3488854"/>
+          </a:xfrm>
+          <a:prstGeom prst="rect">
+            <a:avLst/>
+          </a:prstGeom>
+        </p:spPr>
+        <p:txBody>
+          <a:bodyPr spcFirstLastPara="1" wrap="square" lIns="91425" tIns="91425" rIns="91425" bIns="91425" anchor="t" anchorCtr="0"/>
+          <a:lstStyle>
+            <a:lvl1pPr marL="457200" lvl="0" indent="-355600">
+              <a:spcBef>
+                <a:spcPts val="600"/>
+              </a:spcBef>
+              <a:spcAft>
+                <a:spcPts val="0"/>
+              </a:spcAft>
+              <a:buSzPts val="2000"/>
+              <a:buChar char="▰"/>
+              <a:defRPr sz="2000"/>
+            </a:lvl1pPr>
+            <a:lvl2pPr marL="914400" lvl="1" indent="-355600">
+              <a:spcBef>
+                <a:spcPts val="1000"/>
+              </a:spcBef>
+              <a:spcAft>
+                <a:spcPts val="0"/>
+              </a:spcAft>
+              <a:buSzPts val="2000"/>
+              <a:buChar char="▻"/>
+              <a:defRPr sz="2000"/>
+            </a:lvl2pPr>
+            <a:lvl3pPr marL="1371600" lvl="2" indent="-355600">
+              <a:spcBef>
+                <a:spcPts val="1000"/>
+              </a:spcBef>
+              <a:spcAft>
+                <a:spcPts val="0"/>
+              </a:spcAft>
+              <a:buSzPts val="2000"/>
+              <a:buChar char="▻"/>
+              <a:defRPr sz="2000"/>
+            </a:lvl3pPr>
+            <a:lvl4pPr marL="1828800" lvl="3" indent="-355600">
+              <a:spcBef>
+                <a:spcPts val="1000"/>
+              </a:spcBef>
+              <a:spcAft>
+                <a:spcPts val="0"/>
+              </a:spcAft>
+              <a:buSzPts val="2000"/>
+              <a:buChar char="▻"/>
+              <a:defRPr sz="2000"/>
+            </a:lvl4pPr>
+            <a:lvl5pPr marL="2286000" lvl="4" indent="-355600">
+              <a:spcBef>
+                <a:spcPts val="1000"/>
+              </a:spcBef>
+              <a:spcAft>
+                <a:spcPts val="0"/>
+              </a:spcAft>
+              <a:buSzPts val="2000"/>
+              <a:buChar char="▻"/>
+              <a:defRPr sz="2000"/>
+            </a:lvl5pPr>
+            <a:lvl6pPr marL="2743200" lvl="5" indent="-355600">
+              <a:spcBef>
+                <a:spcPts val="1000"/>
+              </a:spcBef>
+              <a:spcAft>
+                <a:spcPts val="0"/>
+              </a:spcAft>
+              <a:buSzPts val="2000"/>
+              <a:buChar char="▻"/>
+              <a:defRPr sz="2000"/>
+            </a:lvl6pPr>
+            <a:lvl7pPr marL="3200400" lvl="6" indent="-355600">
+              <a:spcBef>
+                <a:spcPts val="1000"/>
+              </a:spcBef>
+              <a:spcAft>
+                <a:spcPts val="0"/>
+              </a:spcAft>
+              <a:buSzPts val="2000"/>
+              <a:buChar char="▻"/>
+              <a:defRPr sz="2000"/>
+            </a:lvl7pPr>
+            <a:lvl8pPr marL="3657600" lvl="7" indent="-355600">
+              <a:spcBef>
+                <a:spcPts val="1000"/>
+              </a:spcBef>
+              <a:spcAft>
+                <a:spcPts val="0"/>
+              </a:spcAft>
+              <a:buSzPts val="2000"/>
+              <a:buChar char="▻"/>
+              <a:defRPr sz="2000"/>
+            </a:lvl8pPr>
+            <a:lvl9pPr marL="4114800" lvl="8" indent="-355600">
+              <a:spcBef>
+                <a:spcPts val="1000"/>
+              </a:spcBef>
+              <a:spcAft>
+                <a:spcPts val="1000"/>
+              </a:spcAft>
+              <a:buSzPts val="2000"/>
+              <a:buChar char="▻"/>
+              <a:defRPr sz="2000"/>
+            </a:lvl9pPr>
+          </a:lstStyle>
+          <a:p>
+            <a:endParaRPr dirty="0"/>
+          </a:p>
+        </p:txBody>
+      </p:sp>
+      <p:sp>
+        <p:nvSpPr>
+          <p:cNvPr id="100" name="Google Shape;100;p6"/>
+          <p:cNvSpPr txBox="1">
+            <a:spLocks noGrp="1"/>
+          </p:cNvSpPr>
+          <p:nvPr>
+            <p:ph type="body" idx="2"/>
+          </p:nvPr>
+        </p:nvSpPr>
+        <p:spPr>
+          <a:xfrm>
+            <a:off x="4800600" y="1153525"/>
+            <a:ext cx="3886199" cy="3482175"/>
+          </a:xfrm>
+          <a:prstGeom prst="rect">
+            <a:avLst/>
+          </a:prstGeom>
+        </p:spPr>
+        <p:txBody>
+          <a:bodyPr spcFirstLastPara="1" wrap="square" lIns="91425" tIns="91425" rIns="91425" bIns="91425" anchor="t" anchorCtr="0"/>
+          <a:lstStyle>
+            <a:lvl1pPr marL="457200" lvl="0" indent="-355600">
+              <a:spcBef>
+                <a:spcPts val="600"/>
+              </a:spcBef>
+              <a:spcAft>
+                <a:spcPts val="0"/>
+              </a:spcAft>
+              <a:buSzPts val="2000"/>
+              <a:buChar char="▰"/>
+              <a:defRPr sz="2000"/>
+            </a:lvl1pPr>
+            <a:lvl2pPr marL="914400" lvl="1" indent="-355600">
+              <a:spcBef>
+                <a:spcPts val="1000"/>
+              </a:spcBef>
+              <a:spcAft>
+                <a:spcPts val="0"/>
+              </a:spcAft>
+              <a:buSzPts val="2000"/>
+              <a:buChar char="▻"/>
+              <a:defRPr sz="2000"/>
+            </a:lvl2pPr>
+            <a:lvl3pPr marL="1371600" lvl="2" indent="-355600">
+              <a:spcBef>
+                <a:spcPts val="1000"/>
+              </a:spcBef>
+              <a:spcAft>
+                <a:spcPts val="0"/>
+              </a:spcAft>
+              <a:buSzPts val="2000"/>
+              <a:buChar char="▻"/>
+              <a:defRPr sz="2000"/>
+            </a:lvl3pPr>
+            <a:lvl4pPr marL="1828800" lvl="3" indent="-355600">
+              <a:spcBef>
+                <a:spcPts val="1000"/>
+              </a:spcBef>
+              <a:spcAft>
+                <a:spcPts val="0"/>
+              </a:spcAft>
+              <a:buSzPts val="2000"/>
+              <a:buChar char="▻"/>
+              <a:defRPr sz="2000"/>
+            </a:lvl4pPr>
+            <a:lvl5pPr marL="2286000" lvl="4" indent="-355600">
+              <a:spcBef>
+                <a:spcPts val="1000"/>
+              </a:spcBef>
+              <a:spcAft>
+                <a:spcPts val="0"/>
+              </a:spcAft>
+              <a:buSzPts val="2000"/>
+              <a:buChar char="▻"/>
+              <a:defRPr sz="2000"/>
+            </a:lvl5pPr>
+            <a:lvl6pPr marL="2743200" lvl="5" indent="-355600">
+              <a:spcBef>
+                <a:spcPts val="1000"/>
+              </a:spcBef>
+              <a:spcAft>
+                <a:spcPts val="0"/>
+              </a:spcAft>
+              <a:buSzPts val="2000"/>
+              <a:buChar char="▻"/>
+              <a:defRPr sz="2000"/>
+            </a:lvl6pPr>
+            <a:lvl7pPr marL="3200400" lvl="6" indent="-355600">
+              <a:spcBef>
+                <a:spcPts val="1000"/>
+              </a:spcBef>
+              <a:spcAft>
+                <a:spcPts val="0"/>
+              </a:spcAft>
+              <a:buSzPts val="2000"/>
+              <a:buChar char="▻"/>
+              <a:defRPr sz="2000"/>
+            </a:lvl7pPr>
+            <a:lvl8pPr marL="3657600" lvl="7" indent="-355600">
+              <a:spcBef>
+                <a:spcPts val="1000"/>
+              </a:spcBef>
+              <a:spcAft>
+                <a:spcPts val="0"/>
+              </a:spcAft>
+              <a:buSzPts val="2000"/>
+              <a:buChar char="▻"/>
+              <a:defRPr sz="2000"/>
+            </a:lvl8pPr>
+            <a:lvl9pPr marL="4114800" lvl="8" indent="-355600">
+              <a:spcBef>
+                <a:spcPts val="1000"/>
+              </a:spcBef>
+              <a:spcAft>
+                <a:spcPts val="1000"/>
+              </a:spcAft>
+              <a:buSzPts val="2000"/>
+              <a:buChar char="▻"/>
+              <a:defRPr sz="2000"/>
+            </a:lvl9pPr>
+          </a:lstStyle>
+          <a:p>
+            <a:endParaRPr dirty="0"/>
+          </a:p>
+        </p:txBody>
+      </p:sp>
+      <p:sp>
+        <p:nvSpPr>
+          <p:cNvPr id="101" name="Google Shape;101;p6"/>
+          <p:cNvSpPr txBox="1">
+            <a:spLocks noGrp="1"/>
+          </p:cNvSpPr>
+          <p:nvPr>
+            <p:ph type="sldNum" idx="12"/>
+          </p:nvPr>
+        </p:nvSpPr>
+        <p:spPr>
+          <a:xfrm>
+            <a:off x="7618000" y="4636500"/>
+            <a:ext cx="1487400" cy="315600"/>
+          </a:xfrm>
+          <a:prstGeom prst="rect">
+            <a:avLst/>
+          </a:prstGeom>
+        </p:spPr>
+        <p:txBody>
+          <a:bodyPr spcFirstLastPara="1" wrap="square" lIns="91425" tIns="91425" rIns="91425" bIns="91425" anchor="ctr" anchorCtr="0">
+            <a:noAutofit/>
+          </a:bodyPr>
+          <a:lstStyle>
+            <a:lvl1pPr lvl="0">
+              <a:buNone/>
+              <a:defRPr/>
+            </a:lvl1pPr>
+            <a:lvl2pPr lvl="1">
+              <a:buNone/>
+              <a:defRPr/>
+            </a:lvl2pPr>
+            <a:lvl3pPr lvl="2">
+              <a:buNone/>
+              <a:defRPr/>
+            </a:lvl3pPr>
+            <a:lvl4pPr lvl="3">
+              <a:buNone/>
+              <a:defRPr/>
+            </a:lvl4pPr>
+            <a:lvl5pPr lvl="4">
+              <a:buNone/>
+              <a:defRPr/>
+            </a:lvl5pPr>
+            <a:lvl6pPr lvl="5">
+              <a:buNone/>
+              <a:defRPr/>
+            </a:lvl6pPr>
+            <a:lvl7pPr lvl="6">
+              <a:buNone/>
+              <a:defRPr/>
+            </a:lvl7pPr>
+            <a:lvl8pPr lvl="7">
+              <a:buNone/>
+              <a:defRPr/>
+            </a:lvl8pPr>
+            <a:lvl9pPr lvl="8">
+              <a:buNone/>
+              <a:defRPr/>
+            </a:lvl9pPr>
+          </a:lstStyle>
+          <a:p>
+            <a:pPr marL="0" lvl="0" indent="0" algn="r" rtl="0">
+              <a:spcBef>
+                <a:spcPts val="0"/>
+              </a:spcBef>
+              <a:spcAft>
+                <a:spcPts val="0"/>
+              </a:spcAft>
+              <a:buNone/>
+            </a:pPr>
+            <a:fld id="{00000000-1234-1234-1234-123412341234}" type="slidenum">
+              <a:rPr lang="en"/>
+              <a:t>‹#›</a:t>
+            </a:fld>
+            <a:endParaRPr/>
+          </a:p>
+        </p:txBody>
+      </p:sp>
+    </p:spTree>
+    <p:extLst>
+      <p:ext uri="{BB962C8B-B14F-4D97-AF65-F5344CB8AC3E}">
+        <p14:creationId xmlns:p14="http://schemas.microsoft.com/office/powerpoint/2010/main" val="1061052172"/>
+      </p:ext>
+    </p:extLst>
+  </p:cSld>
+  <p:clrMapOvr>
+    <a:masterClrMapping/>
+  </p:clrMapOvr>
+</p:sldLayout>
+</file>
+
+<file path=ppt/slideLayouts/slideLayout6.xml><?xml version="1.0" encoding="utf-8"?>
 <p:sldLayout xmlns:a="http://schemas.openxmlformats.org/drawingml/2006/main" xmlns:r="http://schemas.openxmlformats.org/officeDocument/2006/relationships" xmlns:p="http://schemas.openxmlformats.org/presentationml/2006/main" matchingName="Blank" type="blank">
   <p:cSld name="Blank">
     <p:spTree>
@@ -4876,7 +7068,7 @@
 </p:sldLayout>
 </file>
 
-<file path=ppt/slideLayouts/slideLayout6.xml><?xml version="1.0" encoding="utf-8"?>
+<file path=ppt/slideLayouts/slideLayout7.xml><?xml version="1.0" encoding="utf-8"?>
 <p:sldLayout xmlns:a="http://schemas.openxmlformats.org/drawingml/2006/main" xmlns:r="http://schemas.openxmlformats.org/officeDocument/2006/relationships" xmlns:p="http://schemas.openxmlformats.org/presentationml/2006/main" matchingName="Blank" preserve="1" userDrawn="1">
   <p:cSld name="1_Blank">
     <p:spTree>
@@ -5221,21 +7413,33 @@
       </p:grpSp>
       <p:grpSp>
         <p:nvGrpSpPr>
-          <p:cNvPr id="172" name="Google Shape;172;p10"/>
+          <p:cNvPr id="21" name="Google Shape;172;p10">
+            <a:extLst>
+              <a:ext uri="{FF2B5EF4-FFF2-40B4-BE49-F238E27FC236}">
+                <a16:creationId xmlns:a16="http://schemas.microsoft.com/office/drawing/2014/main" id="{AC6125AB-A934-42A1-BDC1-7D4EA37D9524}"/>
+              </a:ext>
+            </a:extLst>
+          </p:cNvPr>
           <p:cNvGrpSpPr/>
-          <p:nvPr/>
+          <p:nvPr userDrawn="1"/>
         </p:nvGrpSpPr>
         <p:grpSpPr>
           <a:xfrm rot="10800000">
-            <a:off x="-7961" y="-4"/>
-            <a:ext cx="5722959" cy="742954"/>
-            <a:chOff x="5575242" y="4472723"/>
-            <a:chExt cx="2202830" cy="670795"/>
+            <a:off x="-3288" y="-9"/>
+            <a:ext cx="4583250" cy="600370"/>
+            <a:chOff x="5575242" y="4472728"/>
+            <a:chExt cx="2202830" cy="670794"/>
           </a:xfrm>
         </p:grpSpPr>
         <p:sp>
           <p:nvSpPr>
-            <p:cNvPr id="173" name="Google Shape;173;p10"/>
+            <p:cNvPr id="22" name="Google Shape;173;p10">
+              <a:extLst>
+                <a:ext uri="{FF2B5EF4-FFF2-40B4-BE49-F238E27FC236}">
+                  <a16:creationId xmlns:a16="http://schemas.microsoft.com/office/drawing/2014/main" id="{792EA42A-C54E-46BA-99E5-E122A6DEBBB5}"/>
+                </a:ext>
+              </a:extLst>
+            </p:cNvPr>
             <p:cNvSpPr/>
             <p:nvPr/>
           </p:nvSpPr>
@@ -5277,28 +7481,40 @@
         </p:sp>
         <p:grpSp>
           <p:nvGrpSpPr>
-            <p:cNvPr id="174" name="Google Shape;174;p10"/>
+            <p:cNvPr id="23" name="Google Shape;174;p10">
+              <a:extLst>
+                <a:ext uri="{FF2B5EF4-FFF2-40B4-BE49-F238E27FC236}">
+                  <a16:creationId xmlns:a16="http://schemas.microsoft.com/office/drawing/2014/main" id="{A454AD3C-9A6C-4682-9F11-321E93341302}"/>
+                </a:ext>
+              </a:extLst>
+            </p:cNvPr>
             <p:cNvGrpSpPr/>
             <p:nvPr/>
           </p:nvGrpSpPr>
           <p:grpSpPr>
             <a:xfrm flipH="1">
-              <a:off x="5734850" y="4472723"/>
-              <a:ext cx="2040837" cy="670795"/>
-              <a:chOff x="1297954" y="330075"/>
-              <a:chExt cx="5169293" cy="1699506"/>
+              <a:off x="5611893" y="4472728"/>
+              <a:ext cx="2163794" cy="670794"/>
+              <a:chOff x="1297953" y="330090"/>
+              <a:chExt cx="5480735" cy="1699502"/>
             </a:xfrm>
           </p:grpSpPr>
           <p:sp>
             <p:nvSpPr>
-              <p:cNvPr id="175" name="Google Shape;175;p10"/>
+              <p:cNvPr id="27" name="Google Shape;175;p10">
+                <a:extLst>
+                  <a:ext uri="{FF2B5EF4-FFF2-40B4-BE49-F238E27FC236}">
+                    <a16:creationId xmlns:a16="http://schemas.microsoft.com/office/drawing/2014/main" id="{A166FCA5-8063-4C90-89BE-F2BD2E155E69}"/>
+                  </a:ext>
+                </a:extLst>
+              </p:cNvPr>
               <p:cNvSpPr/>
               <p:nvPr/>
             </p:nvSpPr>
             <p:spPr>
               <a:xfrm>
-                <a:off x="1297954" y="330081"/>
-                <a:ext cx="3476700" cy="1699500"/>
+                <a:off x="1297953" y="330090"/>
+                <a:ext cx="4914520" cy="1699500"/>
               </a:xfrm>
               <a:prstGeom prst="rect">
                 <a:avLst/>
@@ -5331,14 +7547,20 @@
           </p:sp>
           <p:sp>
             <p:nvSpPr>
-              <p:cNvPr id="176" name="Google Shape;176;p10"/>
+              <p:cNvPr id="28" name="Google Shape;176;p10">
+                <a:extLst>
+                  <a:ext uri="{FF2B5EF4-FFF2-40B4-BE49-F238E27FC236}">
+                    <a16:creationId xmlns:a16="http://schemas.microsoft.com/office/drawing/2014/main" id="{71402BCC-E531-4BB9-A37D-91C0AFE0B031}"/>
+                  </a:ext>
+                </a:extLst>
+              </p:cNvPr>
               <p:cNvSpPr/>
               <p:nvPr/>
             </p:nvSpPr>
             <p:spPr>
               <a:xfrm>
-                <a:off x="4767747" y="330075"/>
-                <a:ext cx="1699500" cy="1699500"/>
+                <a:off x="6212473" y="330092"/>
+                <a:ext cx="566215" cy="1699500"/>
               </a:xfrm>
               <a:prstGeom prst="rtTriangle">
                 <a:avLst/>
@@ -5372,28 +7594,40 @@
         </p:grpSp>
         <p:grpSp>
           <p:nvGrpSpPr>
-            <p:cNvPr id="177" name="Google Shape;177;p10"/>
+            <p:cNvPr id="24" name="Google Shape;177;p10">
+              <a:extLst>
+                <a:ext uri="{FF2B5EF4-FFF2-40B4-BE49-F238E27FC236}">
+                  <a16:creationId xmlns:a16="http://schemas.microsoft.com/office/drawing/2014/main" id="{CF407E44-3651-4B43-9217-0EA2C24D5E9D}"/>
+                </a:ext>
+              </a:extLst>
+            </p:cNvPr>
             <p:cNvGrpSpPr/>
             <p:nvPr/>
           </p:nvGrpSpPr>
           <p:grpSpPr>
             <a:xfrm flipH="1">
               <a:off x="5578209" y="4646738"/>
-              <a:ext cx="2199863" cy="304563"/>
+              <a:ext cx="2199863" cy="304566"/>
               <a:chOff x="-5827153" y="330075"/>
-              <a:chExt cx="12276019" cy="1699569"/>
+              <a:chExt cx="12276021" cy="1699582"/>
             </a:xfrm>
           </p:grpSpPr>
           <p:sp>
             <p:nvSpPr>
-              <p:cNvPr id="178" name="Google Shape;178;p10"/>
+              <p:cNvPr id="25" name="Google Shape;178;p10">
+                <a:extLst>
+                  <a:ext uri="{FF2B5EF4-FFF2-40B4-BE49-F238E27FC236}">
+                    <a16:creationId xmlns:a16="http://schemas.microsoft.com/office/drawing/2014/main" id="{9640413D-CECB-4FE1-8D3F-A7B52DA280C3}"/>
+                  </a:ext>
+                </a:extLst>
+              </p:cNvPr>
               <p:cNvSpPr/>
               <p:nvPr/>
             </p:nvSpPr>
             <p:spPr>
               <a:xfrm>
-                <a:off x="-5827153" y="330144"/>
-                <a:ext cx="10612200" cy="1699500"/>
+                <a:off x="-5827153" y="330157"/>
+                <a:ext cx="11641543" cy="1699500"/>
               </a:xfrm>
               <a:prstGeom prst="rect">
                 <a:avLst/>
@@ -5426,14 +7660,20 @@
           </p:sp>
           <p:sp>
             <p:nvSpPr>
-              <p:cNvPr id="179" name="Google Shape;179;p10"/>
+              <p:cNvPr id="26" name="Google Shape;179;p10">
+                <a:extLst>
+                  <a:ext uri="{FF2B5EF4-FFF2-40B4-BE49-F238E27FC236}">
+                    <a16:creationId xmlns:a16="http://schemas.microsoft.com/office/drawing/2014/main" id="{5BA488C7-1BE9-4C2F-A270-74E45E6B1C86}"/>
+                  </a:ext>
+                </a:extLst>
+              </p:cNvPr>
               <p:cNvSpPr/>
               <p:nvPr/>
             </p:nvSpPr>
             <p:spPr>
               <a:xfrm>
-                <a:off x="4749366" y="330075"/>
-                <a:ext cx="1699500" cy="1699500"/>
+                <a:off x="5814393" y="330075"/>
+                <a:ext cx="634475" cy="1699500"/>
               </a:xfrm>
               <a:prstGeom prst="rtTriangle">
                 <a:avLst/>
@@ -5468,10 +7708,10 @@
       </p:grpSp>
       <p:sp>
         <p:nvSpPr>
-          <p:cNvPr id="20" name="Google Shape;98;p6">
-            <a:extLst>
-              <a:ext uri="{FF2B5EF4-FFF2-40B4-BE49-F238E27FC236}">
-                <a16:creationId xmlns:a16="http://schemas.microsoft.com/office/drawing/2014/main" id="{058E29F2-67F0-44DC-9F25-605C3BBA2BD0}"/>
+          <p:cNvPr id="29" name="Google Shape;98;p6">
+            <a:extLst>
+              <a:ext uri="{FF2B5EF4-FFF2-40B4-BE49-F238E27FC236}">
+                <a16:creationId xmlns:a16="http://schemas.microsoft.com/office/drawing/2014/main" id="{9B541449-1E36-4A2F-91EC-A43C94942C75}"/>
               </a:ext>
             </a:extLst>
           </p:cNvPr>
@@ -5484,8 +7724,8 @@
         </p:nvSpPr>
         <p:spPr>
           <a:xfrm>
-            <a:off x="814275" y="212242"/>
-            <a:ext cx="4118404" cy="337313"/>
+            <a:off x="457199" y="172029"/>
+            <a:ext cx="3884989" cy="259922"/>
           </a:xfrm>
           <a:prstGeom prst="rect">
             <a:avLst/>
@@ -5612,7 +7852,7 @@
 </p:sldLayout>
 </file>
 
-<file path=ppt/slideLayouts/slideLayout7.xml><?xml version="1.0" encoding="utf-8"?>
+<file path=ppt/slideLayouts/slideLayout8.xml><?xml version="1.0" encoding="utf-8"?>
 <p:sldLayout xmlns:a="http://schemas.openxmlformats.org/drawingml/2006/main" xmlns:r="http://schemas.openxmlformats.org/officeDocument/2006/relationships" xmlns:p="http://schemas.openxmlformats.org/presentationml/2006/main" matchingName="Blank" preserve="1" userDrawn="1">
   <p:cSld name="1_Blank">
     <p:spTree>
@@ -5955,23 +8195,168 @@
           </p:sp>
         </p:grpSp>
       </p:grpSp>
+      <p:sp>
+        <p:nvSpPr>
+          <p:cNvPr id="19" name="Google Shape;79;p5">
+            <a:extLst>
+              <a:ext uri="{FF2B5EF4-FFF2-40B4-BE49-F238E27FC236}">
+                <a16:creationId xmlns:a16="http://schemas.microsoft.com/office/drawing/2014/main" id="{C158645B-7908-4698-B29A-BD4E402A9E17}"/>
+              </a:ext>
+            </a:extLst>
+          </p:cNvPr>
+          <p:cNvSpPr txBox="1">
+            <a:spLocks noGrp="1"/>
+          </p:cNvSpPr>
+          <p:nvPr>
+            <p:ph type="body" idx="1"/>
+          </p:nvPr>
+        </p:nvSpPr>
+        <p:spPr>
+          <a:xfrm>
+            <a:off x="451374" y="600361"/>
+            <a:ext cx="8235425" cy="4046365"/>
+          </a:xfrm>
+          <a:prstGeom prst="rect">
+            <a:avLst/>
+          </a:prstGeom>
+        </p:spPr>
+        <p:txBody>
+          <a:bodyPr spcFirstLastPara="1" wrap="square" lIns="91425" tIns="91425" rIns="91425" bIns="91425" anchor="t" anchorCtr="0"/>
+          <a:lstStyle>
+            <a:lvl1pPr marL="457200" lvl="0" indent="-381000">
+              <a:spcBef>
+                <a:spcPts val="600"/>
+              </a:spcBef>
+              <a:spcAft>
+                <a:spcPts val="0"/>
+              </a:spcAft>
+              <a:buSzPts val="2400"/>
+              <a:buChar char="▰"/>
+              <a:defRPr sz="1400"/>
+            </a:lvl1pPr>
+            <a:lvl2pPr marL="914400" lvl="1" indent="-381000">
+              <a:spcBef>
+                <a:spcPts val="1000"/>
+              </a:spcBef>
+              <a:spcAft>
+                <a:spcPts val="0"/>
+              </a:spcAft>
+              <a:buSzPts val="2400"/>
+              <a:buChar char="▻"/>
+              <a:defRPr/>
+            </a:lvl2pPr>
+            <a:lvl3pPr marL="1371600" lvl="2" indent="-381000">
+              <a:spcBef>
+                <a:spcPts val="1000"/>
+              </a:spcBef>
+              <a:spcAft>
+                <a:spcPts val="0"/>
+              </a:spcAft>
+              <a:buSzPts val="2400"/>
+              <a:buChar char="▻"/>
+              <a:defRPr/>
+            </a:lvl3pPr>
+            <a:lvl4pPr marL="1828800" lvl="3" indent="-381000">
+              <a:spcBef>
+                <a:spcPts val="1000"/>
+              </a:spcBef>
+              <a:spcAft>
+                <a:spcPts val="0"/>
+              </a:spcAft>
+              <a:buSzPts val="2400"/>
+              <a:buChar char="▻"/>
+              <a:defRPr/>
+            </a:lvl4pPr>
+            <a:lvl5pPr marL="2286000" lvl="4" indent="-381000">
+              <a:spcBef>
+                <a:spcPts val="1000"/>
+              </a:spcBef>
+              <a:spcAft>
+                <a:spcPts val="0"/>
+              </a:spcAft>
+              <a:buSzPts val="2400"/>
+              <a:buChar char="▻"/>
+              <a:defRPr/>
+            </a:lvl5pPr>
+            <a:lvl6pPr marL="2743200" lvl="5" indent="-381000">
+              <a:spcBef>
+                <a:spcPts val="1000"/>
+              </a:spcBef>
+              <a:spcAft>
+                <a:spcPts val="0"/>
+              </a:spcAft>
+              <a:buSzPts val="2400"/>
+              <a:buChar char="▻"/>
+              <a:defRPr/>
+            </a:lvl6pPr>
+            <a:lvl7pPr marL="3200400" lvl="6" indent="-381000">
+              <a:spcBef>
+                <a:spcPts val="1000"/>
+              </a:spcBef>
+              <a:spcAft>
+                <a:spcPts val="0"/>
+              </a:spcAft>
+              <a:buSzPts val="2400"/>
+              <a:buChar char="▻"/>
+              <a:defRPr/>
+            </a:lvl7pPr>
+            <a:lvl8pPr marL="3657600" lvl="7" indent="-381000">
+              <a:spcBef>
+                <a:spcPts val="1000"/>
+              </a:spcBef>
+              <a:spcAft>
+                <a:spcPts val="0"/>
+              </a:spcAft>
+              <a:buSzPts val="2400"/>
+              <a:buChar char="▻"/>
+              <a:defRPr/>
+            </a:lvl8pPr>
+            <a:lvl9pPr marL="4114800" lvl="8" indent="-381000">
+              <a:spcBef>
+                <a:spcPts val="1000"/>
+              </a:spcBef>
+              <a:spcAft>
+                <a:spcPts val="1000"/>
+              </a:spcAft>
+              <a:buSzPts val="2400"/>
+              <a:buChar char="▻"/>
+              <a:defRPr/>
+            </a:lvl9pPr>
+          </a:lstStyle>
+          <a:p>
+            <a:endParaRPr dirty="0"/>
+          </a:p>
+        </p:txBody>
+      </p:sp>
       <p:grpSp>
         <p:nvGrpSpPr>
-          <p:cNvPr id="172" name="Google Shape;172;p10"/>
+          <p:cNvPr id="21" name="Google Shape;172;p10">
+            <a:extLst>
+              <a:ext uri="{FF2B5EF4-FFF2-40B4-BE49-F238E27FC236}">
+                <a16:creationId xmlns:a16="http://schemas.microsoft.com/office/drawing/2014/main" id="{51E9EB8F-6EA9-4F7C-8CCD-3E98264A22BC}"/>
+              </a:ext>
+            </a:extLst>
+          </p:cNvPr>
           <p:cNvGrpSpPr/>
-          <p:nvPr/>
+          <p:nvPr userDrawn="1"/>
         </p:nvGrpSpPr>
         <p:grpSpPr>
           <a:xfrm rot="10800000">
-            <a:off x="-7961" y="-4"/>
-            <a:ext cx="5722959" cy="742954"/>
-            <a:chOff x="5575242" y="4472723"/>
-            <a:chExt cx="2202830" cy="670795"/>
+            <a:off x="-3288" y="-9"/>
+            <a:ext cx="4583250" cy="600370"/>
+            <a:chOff x="5575242" y="4472728"/>
+            <a:chExt cx="2202830" cy="670794"/>
           </a:xfrm>
         </p:grpSpPr>
         <p:sp>
           <p:nvSpPr>
-            <p:cNvPr id="173" name="Google Shape;173;p10"/>
+            <p:cNvPr id="22" name="Google Shape;173;p10">
+              <a:extLst>
+                <a:ext uri="{FF2B5EF4-FFF2-40B4-BE49-F238E27FC236}">
+                  <a16:creationId xmlns:a16="http://schemas.microsoft.com/office/drawing/2014/main" id="{10C29F4D-690D-4D00-B9BF-7F69F018A5C5}"/>
+                </a:ext>
+              </a:extLst>
+            </p:cNvPr>
             <p:cNvSpPr/>
             <p:nvPr/>
           </p:nvSpPr>
@@ -6013,28 +8398,40 @@
         </p:sp>
         <p:grpSp>
           <p:nvGrpSpPr>
-            <p:cNvPr id="174" name="Google Shape;174;p10"/>
+            <p:cNvPr id="23" name="Google Shape;174;p10">
+              <a:extLst>
+                <a:ext uri="{FF2B5EF4-FFF2-40B4-BE49-F238E27FC236}">
+                  <a16:creationId xmlns:a16="http://schemas.microsoft.com/office/drawing/2014/main" id="{6269E959-D8F6-4048-932D-B3F561E67E23}"/>
+                </a:ext>
+              </a:extLst>
+            </p:cNvPr>
             <p:cNvGrpSpPr/>
             <p:nvPr/>
           </p:nvGrpSpPr>
           <p:grpSpPr>
             <a:xfrm flipH="1">
-              <a:off x="5734850" y="4472723"/>
-              <a:ext cx="2040837" cy="670795"/>
-              <a:chOff x="1297954" y="330075"/>
-              <a:chExt cx="5169293" cy="1699506"/>
+              <a:off x="5611893" y="4472728"/>
+              <a:ext cx="2163794" cy="670794"/>
+              <a:chOff x="1297953" y="330090"/>
+              <a:chExt cx="5480735" cy="1699502"/>
             </a:xfrm>
           </p:grpSpPr>
           <p:sp>
             <p:nvSpPr>
-              <p:cNvPr id="175" name="Google Shape;175;p10"/>
+              <p:cNvPr id="27" name="Google Shape;175;p10">
+                <a:extLst>
+                  <a:ext uri="{FF2B5EF4-FFF2-40B4-BE49-F238E27FC236}">
+                    <a16:creationId xmlns:a16="http://schemas.microsoft.com/office/drawing/2014/main" id="{383FF32F-AA4C-4A7C-85E7-A389080B8F77}"/>
+                  </a:ext>
+                </a:extLst>
+              </p:cNvPr>
               <p:cNvSpPr/>
               <p:nvPr/>
             </p:nvSpPr>
             <p:spPr>
               <a:xfrm>
-                <a:off x="1297954" y="330081"/>
-                <a:ext cx="3476700" cy="1699500"/>
+                <a:off x="1297953" y="330090"/>
+                <a:ext cx="4914520" cy="1699500"/>
               </a:xfrm>
               <a:prstGeom prst="rect">
                 <a:avLst/>
@@ -6067,14 +8464,20 @@
           </p:sp>
           <p:sp>
             <p:nvSpPr>
-              <p:cNvPr id="176" name="Google Shape;176;p10"/>
+              <p:cNvPr id="28" name="Google Shape;176;p10">
+                <a:extLst>
+                  <a:ext uri="{FF2B5EF4-FFF2-40B4-BE49-F238E27FC236}">
+                    <a16:creationId xmlns:a16="http://schemas.microsoft.com/office/drawing/2014/main" id="{2168281E-8BCA-46C9-B53D-76DE58F668BD}"/>
+                  </a:ext>
+                </a:extLst>
+              </p:cNvPr>
               <p:cNvSpPr/>
               <p:nvPr/>
             </p:nvSpPr>
             <p:spPr>
               <a:xfrm>
-                <a:off x="4767747" y="330075"/>
-                <a:ext cx="1699500" cy="1699500"/>
+                <a:off x="6212473" y="330092"/>
+                <a:ext cx="566215" cy="1699500"/>
               </a:xfrm>
               <a:prstGeom prst="rtTriangle">
                 <a:avLst/>
@@ -6108,28 +8511,40 @@
         </p:grpSp>
         <p:grpSp>
           <p:nvGrpSpPr>
-            <p:cNvPr id="177" name="Google Shape;177;p10"/>
+            <p:cNvPr id="24" name="Google Shape;177;p10">
+              <a:extLst>
+                <a:ext uri="{FF2B5EF4-FFF2-40B4-BE49-F238E27FC236}">
+                  <a16:creationId xmlns:a16="http://schemas.microsoft.com/office/drawing/2014/main" id="{50F50474-B3D9-49E2-8C41-FA97A5FEEC8E}"/>
+                </a:ext>
+              </a:extLst>
+            </p:cNvPr>
             <p:cNvGrpSpPr/>
             <p:nvPr/>
           </p:nvGrpSpPr>
           <p:grpSpPr>
             <a:xfrm flipH="1">
               <a:off x="5578209" y="4646738"/>
-              <a:ext cx="2199863" cy="304563"/>
+              <a:ext cx="2199863" cy="304566"/>
               <a:chOff x="-5827153" y="330075"/>
-              <a:chExt cx="12276019" cy="1699569"/>
+              <a:chExt cx="12276021" cy="1699582"/>
             </a:xfrm>
           </p:grpSpPr>
           <p:sp>
             <p:nvSpPr>
-              <p:cNvPr id="178" name="Google Shape;178;p10"/>
+              <p:cNvPr id="25" name="Google Shape;178;p10">
+                <a:extLst>
+                  <a:ext uri="{FF2B5EF4-FFF2-40B4-BE49-F238E27FC236}">
+                    <a16:creationId xmlns:a16="http://schemas.microsoft.com/office/drawing/2014/main" id="{F58B12BD-08BD-460E-800A-22D20CB522A1}"/>
+                  </a:ext>
+                </a:extLst>
+              </p:cNvPr>
               <p:cNvSpPr/>
               <p:nvPr/>
             </p:nvSpPr>
             <p:spPr>
               <a:xfrm>
-                <a:off x="-5827153" y="330144"/>
-                <a:ext cx="10612200" cy="1699500"/>
+                <a:off x="-5827153" y="330157"/>
+                <a:ext cx="11641543" cy="1699500"/>
               </a:xfrm>
               <a:prstGeom prst="rect">
                 <a:avLst/>
@@ -6162,14 +8577,20 @@
           </p:sp>
           <p:sp>
             <p:nvSpPr>
-              <p:cNvPr id="179" name="Google Shape;179;p10"/>
+              <p:cNvPr id="26" name="Google Shape;179;p10">
+                <a:extLst>
+                  <a:ext uri="{FF2B5EF4-FFF2-40B4-BE49-F238E27FC236}">
+                    <a16:creationId xmlns:a16="http://schemas.microsoft.com/office/drawing/2014/main" id="{5B4F7299-649F-4893-99D9-5C835573ADA0}"/>
+                  </a:ext>
+                </a:extLst>
+              </p:cNvPr>
               <p:cNvSpPr/>
               <p:nvPr/>
             </p:nvSpPr>
             <p:spPr>
               <a:xfrm>
-                <a:off x="4749366" y="330075"/>
-                <a:ext cx="1699500" cy="1699500"/>
+                <a:off x="5814393" y="330075"/>
+                <a:ext cx="634475" cy="1699500"/>
               </a:xfrm>
               <a:prstGeom prst="rtTriangle">
                 <a:avLst/>
@@ -6204,143 +8625,10 @@
       </p:grpSp>
       <p:sp>
         <p:nvSpPr>
-          <p:cNvPr id="19" name="Google Shape;79;p5">
-            <a:extLst>
-              <a:ext uri="{FF2B5EF4-FFF2-40B4-BE49-F238E27FC236}">
-                <a16:creationId xmlns:a16="http://schemas.microsoft.com/office/drawing/2014/main" id="{C158645B-7908-4698-B29A-BD4E402A9E17}"/>
-              </a:ext>
-            </a:extLst>
-          </p:cNvPr>
-          <p:cNvSpPr txBox="1">
-            <a:spLocks noGrp="1"/>
-          </p:cNvSpPr>
-          <p:nvPr>
-            <p:ph type="body" idx="1"/>
-          </p:nvPr>
-        </p:nvSpPr>
-        <p:spPr>
-          <a:xfrm>
-            <a:off x="814275" y="742948"/>
-            <a:ext cx="6958026" cy="3903778"/>
-          </a:xfrm>
-          <a:prstGeom prst="rect">
-            <a:avLst/>
-          </a:prstGeom>
-        </p:spPr>
-        <p:txBody>
-          <a:bodyPr spcFirstLastPara="1" wrap="square" lIns="91425" tIns="91425" rIns="91425" bIns="91425" anchor="t" anchorCtr="0"/>
-          <a:lstStyle>
-            <a:lvl1pPr marL="457200" lvl="0" indent="-381000">
-              <a:spcBef>
-                <a:spcPts val="600"/>
-              </a:spcBef>
-              <a:spcAft>
-                <a:spcPts val="0"/>
-              </a:spcAft>
-              <a:buSzPts val="2400"/>
-              <a:buChar char="▰"/>
-              <a:defRPr sz="1400"/>
-            </a:lvl1pPr>
-            <a:lvl2pPr marL="914400" lvl="1" indent="-381000">
-              <a:spcBef>
-                <a:spcPts val="1000"/>
-              </a:spcBef>
-              <a:spcAft>
-                <a:spcPts val="0"/>
-              </a:spcAft>
-              <a:buSzPts val="2400"/>
-              <a:buChar char="▻"/>
-              <a:defRPr/>
-            </a:lvl2pPr>
-            <a:lvl3pPr marL="1371600" lvl="2" indent="-381000">
-              <a:spcBef>
-                <a:spcPts val="1000"/>
-              </a:spcBef>
-              <a:spcAft>
-                <a:spcPts val="0"/>
-              </a:spcAft>
-              <a:buSzPts val="2400"/>
-              <a:buChar char="▻"/>
-              <a:defRPr/>
-            </a:lvl3pPr>
-            <a:lvl4pPr marL="1828800" lvl="3" indent="-381000">
-              <a:spcBef>
-                <a:spcPts val="1000"/>
-              </a:spcBef>
-              <a:spcAft>
-                <a:spcPts val="0"/>
-              </a:spcAft>
-              <a:buSzPts val="2400"/>
-              <a:buChar char="▻"/>
-              <a:defRPr/>
-            </a:lvl4pPr>
-            <a:lvl5pPr marL="2286000" lvl="4" indent="-381000">
-              <a:spcBef>
-                <a:spcPts val="1000"/>
-              </a:spcBef>
-              <a:spcAft>
-                <a:spcPts val="0"/>
-              </a:spcAft>
-              <a:buSzPts val="2400"/>
-              <a:buChar char="▻"/>
-              <a:defRPr/>
-            </a:lvl5pPr>
-            <a:lvl6pPr marL="2743200" lvl="5" indent="-381000">
-              <a:spcBef>
-                <a:spcPts val="1000"/>
-              </a:spcBef>
-              <a:spcAft>
-                <a:spcPts val="0"/>
-              </a:spcAft>
-              <a:buSzPts val="2400"/>
-              <a:buChar char="▻"/>
-              <a:defRPr/>
-            </a:lvl6pPr>
-            <a:lvl7pPr marL="3200400" lvl="6" indent="-381000">
-              <a:spcBef>
-                <a:spcPts val="1000"/>
-              </a:spcBef>
-              <a:spcAft>
-                <a:spcPts val="0"/>
-              </a:spcAft>
-              <a:buSzPts val="2400"/>
-              <a:buChar char="▻"/>
-              <a:defRPr/>
-            </a:lvl7pPr>
-            <a:lvl8pPr marL="3657600" lvl="7" indent="-381000">
-              <a:spcBef>
-                <a:spcPts val="1000"/>
-              </a:spcBef>
-              <a:spcAft>
-                <a:spcPts val="0"/>
-              </a:spcAft>
-              <a:buSzPts val="2400"/>
-              <a:buChar char="▻"/>
-              <a:defRPr/>
-            </a:lvl8pPr>
-            <a:lvl9pPr marL="4114800" lvl="8" indent="-381000">
-              <a:spcBef>
-                <a:spcPts val="1000"/>
-              </a:spcBef>
-              <a:spcAft>
-                <a:spcPts val="1000"/>
-              </a:spcAft>
-              <a:buSzPts val="2400"/>
-              <a:buChar char="▻"/>
-              <a:defRPr/>
-            </a:lvl9pPr>
-          </a:lstStyle>
-          <a:p>
-            <a:endParaRPr dirty="0"/>
-          </a:p>
-        </p:txBody>
-      </p:sp>
-      <p:sp>
-        <p:nvSpPr>
-          <p:cNvPr id="20" name="Google Shape;98;p6">
-            <a:extLst>
-              <a:ext uri="{FF2B5EF4-FFF2-40B4-BE49-F238E27FC236}">
-                <a16:creationId xmlns:a16="http://schemas.microsoft.com/office/drawing/2014/main" id="{058E29F2-67F0-44DC-9F25-605C3BBA2BD0}"/>
+          <p:cNvPr id="29" name="Google Shape;98;p6">
+            <a:extLst>
+              <a:ext uri="{FF2B5EF4-FFF2-40B4-BE49-F238E27FC236}">
+                <a16:creationId xmlns:a16="http://schemas.microsoft.com/office/drawing/2014/main" id="{5DEEFF67-A5BC-482B-BD8A-2304F16AEC80}"/>
               </a:ext>
             </a:extLst>
           </p:cNvPr>
@@ -6353,8 +8641,8 @@
         </p:nvSpPr>
         <p:spPr>
           <a:xfrm>
-            <a:off x="814275" y="212242"/>
-            <a:ext cx="4118404" cy="337313"/>
+            <a:off x="451375" y="186451"/>
+            <a:ext cx="3890813" cy="254889"/>
           </a:xfrm>
           <a:prstGeom prst="rect">
             <a:avLst/>
@@ -6481,7 +8769,7 @@
 </p:sldLayout>
 </file>
 
-<file path=ppt/slideLayouts/slideLayout8.xml><?xml version="1.0" encoding="utf-8"?>
+<file path=ppt/slideLayouts/slideLayout9.xml><?xml version="1.0" encoding="utf-8"?>
 <p:sldLayout xmlns:a="http://schemas.openxmlformats.org/drawingml/2006/main" xmlns:r="http://schemas.openxmlformats.org/officeDocument/2006/relationships" xmlns:p="http://schemas.openxmlformats.org/presentationml/2006/main" matchingName="Blank" preserve="1" userDrawn="1">
   <p:cSld name="1_Blank">
     <p:spTree>
@@ -6824,23 +9112,301 @@
           </p:sp>
         </p:grpSp>
       </p:grpSp>
+      <p:sp>
+        <p:nvSpPr>
+          <p:cNvPr id="19" name="Google Shape;79;p5">
+            <a:extLst>
+              <a:ext uri="{FF2B5EF4-FFF2-40B4-BE49-F238E27FC236}">
+                <a16:creationId xmlns:a16="http://schemas.microsoft.com/office/drawing/2014/main" id="{C158645B-7908-4698-B29A-BD4E402A9E17}"/>
+              </a:ext>
+            </a:extLst>
+          </p:cNvPr>
+          <p:cNvSpPr txBox="1">
+            <a:spLocks noGrp="1"/>
+          </p:cNvSpPr>
+          <p:nvPr>
+            <p:ph type="body" idx="1"/>
+          </p:nvPr>
+        </p:nvSpPr>
+        <p:spPr>
+          <a:xfrm>
+            <a:off x="458473" y="600361"/>
+            <a:ext cx="3950162" cy="4046365"/>
+          </a:xfrm>
+          <a:prstGeom prst="rect">
+            <a:avLst/>
+          </a:prstGeom>
+        </p:spPr>
+        <p:txBody>
+          <a:bodyPr spcFirstLastPara="1" wrap="square" lIns="91425" tIns="91425" rIns="91425" bIns="91425" anchor="t" anchorCtr="0"/>
+          <a:lstStyle>
+            <a:lvl1pPr marL="457200" lvl="0" indent="-381000">
+              <a:spcBef>
+                <a:spcPts val="600"/>
+              </a:spcBef>
+              <a:spcAft>
+                <a:spcPts val="0"/>
+              </a:spcAft>
+              <a:buSzPts val="2400"/>
+              <a:buChar char="▰"/>
+              <a:defRPr sz="1400"/>
+            </a:lvl1pPr>
+            <a:lvl2pPr marL="914400" lvl="1" indent="-381000">
+              <a:spcBef>
+                <a:spcPts val="1000"/>
+              </a:spcBef>
+              <a:spcAft>
+                <a:spcPts val="0"/>
+              </a:spcAft>
+              <a:buSzPts val="2400"/>
+              <a:buChar char="▻"/>
+              <a:defRPr/>
+            </a:lvl2pPr>
+            <a:lvl3pPr marL="1371600" lvl="2" indent="-381000">
+              <a:spcBef>
+                <a:spcPts val="1000"/>
+              </a:spcBef>
+              <a:spcAft>
+                <a:spcPts val="0"/>
+              </a:spcAft>
+              <a:buSzPts val="2400"/>
+              <a:buChar char="▻"/>
+              <a:defRPr/>
+            </a:lvl3pPr>
+            <a:lvl4pPr marL="1828800" lvl="3" indent="-381000">
+              <a:spcBef>
+                <a:spcPts val="1000"/>
+              </a:spcBef>
+              <a:spcAft>
+                <a:spcPts val="0"/>
+              </a:spcAft>
+              <a:buSzPts val="2400"/>
+              <a:buChar char="▻"/>
+              <a:defRPr/>
+            </a:lvl4pPr>
+            <a:lvl5pPr marL="2286000" lvl="4" indent="-381000">
+              <a:spcBef>
+                <a:spcPts val="1000"/>
+              </a:spcBef>
+              <a:spcAft>
+                <a:spcPts val="0"/>
+              </a:spcAft>
+              <a:buSzPts val="2400"/>
+              <a:buChar char="▻"/>
+              <a:defRPr/>
+            </a:lvl5pPr>
+            <a:lvl6pPr marL="2743200" lvl="5" indent="-381000">
+              <a:spcBef>
+                <a:spcPts val="1000"/>
+              </a:spcBef>
+              <a:spcAft>
+                <a:spcPts val="0"/>
+              </a:spcAft>
+              <a:buSzPts val="2400"/>
+              <a:buChar char="▻"/>
+              <a:defRPr/>
+            </a:lvl6pPr>
+            <a:lvl7pPr marL="3200400" lvl="6" indent="-381000">
+              <a:spcBef>
+                <a:spcPts val="1000"/>
+              </a:spcBef>
+              <a:spcAft>
+                <a:spcPts val="0"/>
+              </a:spcAft>
+              <a:buSzPts val="2400"/>
+              <a:buChar char="▻"/>
+              <a:defRPr/>
+            </a:lvl7pPr>
+            <a:lvl8pPr marL="3657600" lvl="7" indent="-381000">
+              <a:spcBef>
+                <a:spcPts val="1000"/>
+              </a:spcBef>
+              <a:spcAft>
+                <a:spcPts val="0"/>
+              </a:spcAft>
+              <a:buSzPts val="2400"/>
+              <a:buChar char="▻"/>
+              <a:defRPr/>
+            </a:lvl8pPr>
+            <a:lvl9pPr marL="4114800" lvl="8" indent="-381000">
+              <a:spcBef>
+                <a:spcPts val="1000"/>
+              </a:spcBef>
+              <a:spcAft>
+                <a:spcPts val="1000"/>
+              </a:spcAft>
+              <a:buSzPts val="2400"/>
+              <a:buChar char="▻"/>
+              <a:defRPr/>
+            </a:lvl9pPr>
+          </a:lstStyle>
+          <a:p>
+            <a:endParaRPr dirty="0"/>
+          </a:p>
+        </p:txBody>
+      </p:sp>
+      <p:sp>
+        <p:nvSpPr>
+          <p:cNvPr id="21" name="Google Shape;79;p5">
+            <a:extLst>
+              <a:ext uri="{FF2B5EF4-FFF2-40B4-BE49-F238E27FC236}">
+                <a16:creationId xmlns:a16="http://schemas.microsoft.com/office/drawing/2014/main" id="{D187CDD8-77CC-44EC-9A35-0FF0C7AAD200}"/>
+              </a:ext>
+            </a:extLst>
+          </p:cNvPr>
+          <p:cNvSpPr txBox="1">
+            <a:spLocks noGrp="1"/>
+          </p:cNvSpPr>
+          <p:nvPr>
+            <p:ph type="body" idx="13"/>
+          </p:nvPr>
+        </p:nvSpPr>
+        <p:spPr>
+          <a:xfrm>
+            <a:off x="4772275" y="600361"/>
+            <a:ext cx="3950161" cy="4046365"/>
+          </a:xfrm>
+          <a:prstGeom prst="rect">
+            <a:avLst/>
+          </a:prstGeom>
+        </p:spPr>
+        <p:txBody>
+          <a:bodyPr spcFirstLastPara="1" wrap="square" lIns="91425" tIns="91425" rIns="91425" bIns="91425" anchor="t" anchorCtr="0"/>
+          <a:lstStyle>
+            <a:lvl1pPr marL="457200" lvl="0" indent="-381000">
+              <a:spcBef>
+                <a:spcPts val="600"/>
+              </a:spcBef>
+              <a:spcAft>
+                <a:spcPts val="0"/>
+              </a:spcAft>
+              <a:buSzPts val="2400"/>
+              <a:buChar char="▰"/>
+              <a:defRPr sz="1400"/>
+            </a:lvl1pPr>
+            <a:lvl2pPr marL="914400" lvl="1" indent="-381000">
+              <a:spcBef>
+                <a:spcPts val="1000"/>
+              </a:spcBef>
+              <a:spcAft>
+                <a:spcPts val="0"/>
+              </a:spcAft>
+              <a:buSzPts val="2400"/>
+              <a:buChar char="▻"/>
+              <a:defRPr/>
+            </a:lvl2pPr>
+            <a:lvl3pPr marL="1371600" lvl="2" indent="-381000">
+              <a:spcBef>
+                <a:spcPts val="1000"/>
+              </a:spcBef>
+              <a:spcAft>
+                <a:spcPts val="0"/>
+              </a:spcAft>
+              <a:buSzPts val="2400"/>
+              <a:buChar char="▻"/>
+              <a:defRPr/>
+            </a:lvl3pPr>
+            <a:lvl4pPr marL="1828800" lvl="3" indent="-381000">
+              <a:spcBef>
+                <a:spcPts val="1000"/>
+              </a:spcBef>
+              <a:spcAft>
+                <a:spcPts val="0"/>
+              </a:spcAft>
+              <a:buSzPts val="2400"/>
+              <a:buChar char="▻"/>
+              <a:defRPr/>
+            </a:lvl4pPr>
+            <a:lvl5pPr marL="2286000" lvl="4" indent="-381000">
+              <a:spcBef>
+                <a:spcPts val="1000"/>
+              </a:spcBef>
+              <a:spcAft>
+                <a:spcPts val="0"/>
+              </a:spcAft>
+              <a:buSzPts val="2400"/>
+              <a:buChar char="▻"/>
+              <a:defRPr/>
+            </a:lvl5pPr>
+            <a:lvl6pPr marL="2743200" lvl="5" indent="-381000">
+              <a:spcBef>
+                <a:spcPts val="1000"/>
+              </a:spcBef>
+              <a:spcAft>
+                <a:spcPts val="0"/>
+              </a:spcAft>
+              <a:buSzPts val="2400"/>
+              <a:buChar char="▻"/>
+              <a:defRPr/>
+            </a:lvl6pPr>
+            <a:lvl7pPr marL="3200400" lvl="6" indent="-381000">
+              <a:spcBef>
+                <a:spcPts val="1000"/>
+              </a:spcBef>
+              <a:spcAft>
+                <a:spcPts val="0"/>
+              </a:spcAft>
+              <a:buSzPts val="2400"/>
+              <a:buChar char="▻"/>
+              <a:defRPr/>
+            </a:lvl7pPr>
+            <a:lvl8pPr marL="3657600" lvl="7" indent="-381000">
+              <a:spcBef>
+                <a:spcPts val="1000"/>
+              </a:spcBef>
+              <a:spcAft>
+                <a:spcPts val="0"/>
+              </a:spcAft>
+              <a:buSzPts val="2400"/>
+              <a:buChar char="▻"/>
+              <a:defRPr/>
+            </a:lvl8pPr>
+            <a:lvl9pPr marL="4114800" lvl="8" indent="-381000">
+              <a:spcBef>
+                <a:spcPts val="1000"/>
+              </a:spcBef>
+              <a:spcAft>
+                <a:spcPts val="1000"/>
+              </a:spcAft>
+              <a:buSzPts val="2400"/>
+              <a:buChar char="▻"/>
+              <a:defRPr/>
+            </a:lvl9pPr>
+          </a:lstStyle>
+          <a:p>
+            <a:endParaRPr dirty="0"/>
+          </a:p>
+        </p:txBody>
+      </p:sp>
       <p:grpSp>
         <p:nvGrpSpPr>
-          <p:cNvPr id="172" name="Google Shape;172;p10"/>
+          <p:cNvPr id="22" name="Google Shape;172;p10">
+            <a:extLst>
+              <a:ext uri="{FF2B5EF4-FFF2-40B4-BE49-F238E27FC236}">
+                <a16:creationId xmlns:a16="http://schemas.microsoft.com/office/drawing/2014/main" id="{75E22C34-0E30-4225-98FF-BF0216DB6D67}"/>
+              </a:ext>
+            </a:extLst>
+          </p:cNvPr>
           <p:cNvGrpSpPr/>
-          <p:nvPr/>
+          <p:nvPr userDrawn="1"/>
         </p:nvGrpSpPr>
         <p:grpSpPr>
           <a:xfrm rot="10800000">
-            <a:off x="-7961" y="-4"/>
-            <a:ext cx="5722959" cy="742954"/>
-            <a:chOff x="5575242" y="4472723"/>
-            <a:chExt cx="2202830" cy="670795"/>
+            <a:off x="-3288" y="-9"/>
+            <a:ext cx="4583250" cy="600370"/>
+            <a:chOff x="5575242" y="4472728"/>
+            <a:chExt cx="2202830" cy="670794"/>
           </a:xfrm>
         </p:grpSpPr>
         <p:sp>
           <p:nvSpPr>
-            <p:cNvPr id="173" name="Google Shape;173;p10"/>
+            <p:cNvPr id="23" name="Google Shape;173;p10">
+              <a:extLst>
+                <a:ext uri="{FF2B5EF4-FFF2-40B4-BE49-F238E27FC236}">
+                  <a16:creationId xmlns:a16="http://schemas.microsoft.com/office/drawing/2014/main" id="{57FC667F-3E34-4E20-9053-2A782AC27CF4}"/>
+                </a:ext>
+              </a:extLst>
+            </p:cNvPr>
             <p:cNvSpPr/>
             <p:nvPr/>
           </p:nvSpPr>
@@ -6882,28 +9448,40 @@
         </p:sp>
         <p:grpSp>
           <p:nvGrpSpPr>
-            <p:cNvPr id="174" name="Google Shape;174;p10"/>
+            <p:cNvPr id="24" name="Google Shape;174;p10">
+              <a:extLst>
+                <a:ext uri="{FF2B5EF4-FFF2-40B4-BE49-F238E27FC236}">
+                  <a16:creationId xmlns:a16="http://schemas.microsoft.com/office/drawing/2014/main" id="{0B3BB4D6-0235-4277-8372-B15A47961DEF}"/>
+                </a:ext>
+              </a:extLst>
+            </p:cNvPr>
             <p:cNvGrpSpPr/>
             <p:nvPr/>
           </p:nvGrpSpPr>
           <p:grpSpPr>
             <a:xfrm flipH="1">
-              <a:off x="5734850" y="4472723"/>
-              <a:ext cx="2040837" cy="670795"/>
-              <a:chOff x="1297954" y="330075"/>
-              <a:chExt cx="5169293" cy="1699506"/>
+              <a:off x="5611893" y="4472728"/>
+              <a:ext cx="2163794" cy="670794"/>
+              <a:chOff x="1297953" y="330090"/>
+              <a:chExt cx="5480735" cy="1699502"/>
             </a:xfrm>
           </p:grpSpPr>
           <p:sp>
             <p:nvSpPr>
-              <p:cNvPr id="175" name="Google Shape;175;p10"/>
+              <p:cNvPr id="28" name="Google Shape;175;p10">
+                <a:extLst>
+                  <a:ext uri="{FF2B5EF4-FFF2-40B4-BE49-F238E27FC236}">
+                    <a16:creationId xmlns:a16="http://schemas.microsoft.com/office/drawing/2014/main" id="{06E96CE3-389A-41D6-AC88-391C1CD52D3D}"/>
+                  </a:ext>
+                </a:extLst>
+              </p:cNvPr>
               <p:cNvSpPr/>
               <p:nvPr/>
             </p:nvSpPr>
             <p:spPr>
               <a:xfrm>
-                <a:off x="1297954" y="330081"/>
-                <a:ext cx="3476700" cy="1699500"/>
+                <a:off x="1297953" y="330090"/>
+                <a:ext cx="4914520" cy="1699500"/>
               </a:xfrm>
               <a:prstGeom prst="rect">
                 <a:avLst/>
@@ -6936,14 +9514,20 @@
           </p:sp>
           <p:sp>
             <p:nvSpPr>
-              <p:cNvPr id="176" name="Google Shape;176;p10"/>
+              <p:cNvPr id="29" name="Google Shape;176;p10">
+                <a:extLst>
+                  <a:ext uri="{FF2B5EF4-FFF2-40B4-BE49-F238E27FC236}">
+                    <a16:creationId xmlns:a16="http://schemas.microsoft.com/office/drawing/2014/main" id="{EA62C617-AFFE-4BC0-A44D-13FDB3788C2F}"/>
+                  </a:ext>
+                </a:extLst>
+              </p:cNvPr>
               <p:cNvSpPr/>
               <p:nvPr/>
             </p:nvSpPr>
             <p:spPr>
               <a:xfrm>
-                <a:off x="4767747" y="330075"/>
-                <a:ext cx="1699500" cy="1699500"/>
+                <a:off x="6212473" y="330092"/>
+                <a:ext cx="566215" cy="1699500"/>
               </a:xfrm>
               <a:prstGeom prst="rtTriangle">
                 <a:avLst/>
@@ -6977,28 +9561,40 @@
         </p:grpSp>
         <p:grpSp>
           <p:nvGrpSpPr>
-            <p:cNvPr id="177" name="Google Shape;177;p10"/>
+            <p:cNvPr id="25" name="Google Shape;177;p10">
+              <a:extLst>
+                <a:ext uri="{FF2B5EF4-FFF2-40B4-BE49-F238E27FC236}">
+                  <a16:creationId xmlns:a16="http://schemas.microsoft.com/office/drawing/2014/main" id="{7421F6D4-41AD-4407-81E9-BF4842CD211D}"/>
+                </a:ext>
+              </a:extLst>
+            </p:cNvPr>
             <p:cNvGrpSpPr/>
             <p:nvPr/>
           </p:nvGrpSpPr>
           <p:grpSpPr>
             <a:xfrm flipH="1">
               <a:off x="5578209" y="4646738"/>
-              <a:ext cx="2199863" cy="304563"/>
+              <a:ext cx="2199863" cy="304566"/>
               <a:chOff x="-5827153" y="330075"/>
-              <a:chExt cx="12276019" cy="1699569"/>
+              <a:chExt cx="12276021" cy="1699582"/>
             </a:xfrm>
           </p:grpSpPr>
           <p:sp>
             <p:nvSpPr>
-              <p:cNvPr id="178" name="Google Shape;178;p10"/>
+              <p:cNvPr id="26" name="Google Shape;178;p10">
+                <a:extLst>
+                  <a:ext uri="{FF2B5EF4-FFF2-40B4-BE49-F238E27FC236}">
+                    <a16:creationId xmlns:a16="http://schemas.microsoft.com/office/drawing/2014/main" id="{0A43C0A8-788C-463B-895F-03E9B8220BBB}"/>
+                  </a:ext>
+                </a:extLst>
+              </p:cNvPr>
               <p:cNvSpPr/>
               <p:nvPr/>
             </p:nvSpPr>
             <p:spPr>
               <a:xfrm>
-                <a:off x="-5827153" y="330144"/>
-                <a:ext cx="10612200" cy="1699500"/>
+                <a:off x="-5827153" y="330157"/>
+                <a:ext cx="11641543" cy="1699500"/>
               </a:xfrm>
               <a:prstGeom prst="rect">
                 <a:avLst/>
@@ -7031,14 +9627,20 @@
           </p:sp>
           <p:sp>
             <p:nvSpPr>
-              <p:cNvPr id="179" name="Google Shape;179;p10"/>
+              <p:cNvPr id="27" name="Google Shape;179;p10">
+                <a:extLst>
+                  <a:ext uri="{FF2B5EF4-FFF2-40B4-BE49-F238E27FC236}">
+                    <a16:creationId xmlns:a16="http://schemas.microsoft.com/office/drawing/2014/main" id="{BAA01DF9-A09B-4CB1-A537-763DC96795F8}"/>
+                  </a:ext>
+                </a:extLst>
+              </p:cNvPr>
               <p:cNvSpPr/>
               <p:nvPr/>
             </p:nvSpPr>
             <p:spPr>
               <a:xfrm>
-                <a:off x="4749366" y="330075"/>
-                <a:ext cx="1699500" cy="1699500"/>
+                <a:off x="5814393" y="330075"/>
+                <a:ext cx="634475" cy="1699500"/>
               </a:xfrm>
               <a:prstGeom prst="rtTriangle">
                 <a:avLst/>
@@ -7073,143 +9675,10 @@
       </p:grpSp>
       <p:sp>
         <p:nvSpPr>
-          <p:cNvPr id="19" name="Google Shape;79;p5">
-            <a:extLst>
-              <a:ext uri="{FF2B5EF4-FFF2-40B4-BE49-F238E27FC236}">
-                <a16:creationId xmlns:a16="http://schemas.microsoft.com/office/drawing/2014/main" id="{C158645B-7908-4698-B29A-BD4E402A9E17}"/>
-              </a:ext>
-            </a:extLst>
-          </p:cNvPr>
-          <p:cNvSpPr txBox="1">
-            <a:spLocks noGrp="1"/>
-          </p:cNvSpPr>
-          <p:nvPr>
-            <p:ph type="body" idx="1"/>
-          </p:nvPr>
-        </p:nvSpPr>
-        <p:spPr>
-          <a:xfrm>
-            <a:off x="814275" y="742948"/>
-            <a:ext cx="3777034" cy="3903778"/>
-          </a:xfrm>
-          <a:prstGeom prst="rect">
-            <a:avLst/>
-          </a:prstGeom>
-        </p:spPr>
-        <p:txBody>
-          <a:bodyPr spcFirstLastPara="1" wrap="square" lIns="91425" tIns="91425" rIns="91425" bIns="91425" anchor="t" anchorCtr="0"/>
-          <a:lstStyle>
-            <a:lvl1pPr marL="457200" lvl="0" indent="-381000">
-              <a:spcBef>
-                <a:spcPts val="600"/>
-              </a:spcBef>
-              <a:spcAft>
-                <a:spcPts val="0"/>
-              </a:spcAft>
-              <a:buSzPts val="2400"/>
-              <a:buChar char="▰"/>
-              <a:defRPr sz="1400"/>
-            </a:lvl1pPr>
-            <a:lvl2pPr marL="914400" lvl="1" indent="-381000">
-              <a:spcBef>
-                <a:spcPts val="1000"/>
-              </a:spcBef>
-              <a:spcAft>
-                <a:spcPts val="0"/>
-              </a:spcAft>
-              <a:buSzPts val="2400"/>
-              <a:buChar char="▻"/>
-              <a:defRPr/>
-            </a:lvl2pPr>
-            <a:lvl3pPr marL="1371600" lvl="2" indent="-381000">
-              <a:spcBef>
-                <a:spcPts val="1000"/>
-              </a:spcBef>
-              <a:spcAft>
-                <a:spcPts val="0"/>
-              </a:spcAft>
-              <a:buSzPts val="2400"/>
-              <a:buChar char="▻"/>
-              <a:defRPr/>
-            </a:lvl3pPr>
-            <a:lvl4pPr marL="1828800" lvl="3" indent="-381000">
-              <a:spcBef>
-                <a:spcPts val="1000"/>
-              </a:spcBef>
-              <a:spcAft>
-                <a:spcPts val="0"/>
-              </a:spcAft>
-              <a:buSzPts val="2400"/>
-              <a:buChar char="▻"/>
-              <a:defRPr/>
-            </a:lvl4pPr>
-            <a:lvl5pPr marL="2286000" lvl="4" indent="-381000">
-              <a:spcBef>
-                <a:spcPts val="1000"/>
-              </a:spcBef>
-              <a:spcAft>
-                <a:spcPts val="0"/>
-              </a:spcAft>
-              <a:buSzPts val="2400"/>
-              <a:buChar char="▻"/>
-              <a:defRPr/>
-            </a:lvl5pPr>
-            <a:lvl6pPr marL="2743200" lvl="5" indent="-381000">
-              <a:spcBef>
-                <a:spcPts val="1000"/>
-              </a:spcBef>
-              <a:spcAft>
-                <a:spcPts val="0"/>
-              </a:spcAft>
-              <a:buSzPts val="2400"/>
-              <a:buChar char="▻"/>
-              <a:defRPr/>
-            </a:lvl6pPr>
-            <a:lvl7pPr marL="3200400" lvl="6" indent="-381000">
-              <a:spcBef>
-                <a:spcPts val="1000"/>
-              </a:spcBef>
-              <a:spcAft>
-                <a:spcPts val="0"/>
-              </a:spcAft>
-              <a:buSzPts val="2400"/>
-              <a:buChar char="▻"/>
-              <a:defRPr/>
-            </a:lvl7pPr>
-            <a:lvl8pPr marL="3657600" lvl="7" indent="-381000">
-              <a:spcBef>
-                <a:spcPts val="1000"/>
-              </a:spcBef>
-              <a:spcAft>
-                <a:spcPts val="0"/>
-              </a:spcAft>
-              <a:buSzPts val="2400"/>
-              <a:buChar char="▻"/>
-              <a:defRPr/>
-            </a:lvl8pPr>
-            <a:lvl9pPr marL="4114800" lvl="8" indent="-381000">
-              <a:spcBef>
-                <a:spcPts val="1000"/>
-              </a:spcBef>
-              <a:spcAft>
-                <a:spcPts val="1000"/>
-              </a:spcAft>
-              <a:buSzPts val="2400"/>
-              <a:buChar char="▻"/>
-              <a:defRPr/>
-            </a:lvl9pPr>
-          </a:lstStyle>
-          <a:p>
-            <a:endParaRPr dirty="0"/>
-          </a:p>
-        </p:txBody>
-      </p:sp>
-      <p:sp>
-        <p:nvSpPr>
-          <p:cNvPr id="20" name="Google Shape;98;p6">
-            <a:extLst>
-              <a:ext uri="{FF2B5EF4-FFF2-40B4-BE49-F238E27FC236}">
-                <a16:creationId xmlns:a16="http://schemas.microsoft.com/office/drawing/2014/main" id="{058E29F2-67F0-44DC-9F25-605C3BBA2BD0}"/>
+          <p:cNvPr id="30" name="Google Shape;98;p6">
+            <a:extLst>
+              <a:ext uri="{FF2B5EF4-FFF2-40B4-BE49-F238E27FC236}">
+                <a16:creationId xmlns:a16="http://schemas.microsoft.com/office/drawing/2014/main" id="{98711A4E-00A1-4E89-8063-A15D993ECFCD}"/>
               </a:ext>
             </a:extLst>
           </p:cNvPr>
@@ -7222,8 +9691,8 @@
         </p:nvSpPr>
         <p:spPr>
           <a:xfrm>
-            <a:off x="814275" y="212242"/>
-            <a:ext cx="4118404" cy="337313"/>
+            <a:off x="458472" y="186451"/>
+            <a:ext cx="3883716" cy="258157"/>
           </a:xfrm>
           <a:prstGeom prst="rect">
             <a:avLst/>
@@ -7329,139 +9798,6 @@
               </a:spcAft>
               <a:buSzPts val="2000"/>
               <a:buNone/>
-              <a:defRPr/>
-            </a:lvl9pPr>
-          </a:lstStyle>
-          <a:p>
-            <a:endParaRPr dirty="0"/>
-          </a:p>
-        </p:txBody>
-      </p:sp>
-      <p:sp>
-        <p:nvSpPr>
-          <p:cNvPr id="21" name="Google Shape;79;p5">
-            <a:extLst>
-              <a:ext uri="{FF2B5EF4-FFF2-40B4-BE49-F238E27FC236}">
-                <a16:creationId xmlns:a16="http://schemas.microsoft.com/office/drawing/2014/main" id="{D187CDD8-77CC-44EC-9A35-0FF0C7AAD200}"/>
-              </a:ext>
-            </a:extLst>
-          </p:cNvPr>
-          <p:cNvSpPr txBox="1">
-            <a:spLocks noGrp="1"/>
-          </p:cNvSpPr>
-          <p:nvPr>
-            <p:ph type="body" idx="13"/>
-          </p:nvPr>
-        </p:nvSpPr>
-        <p:spPr>
-          <a:xfrm>
-            <a:off x="4683952" y="742948"/>
-            <a:ext cx="3777034" cy="3903778"/>
-          </a:xfrm>
-          <a:prstGeom prst="rect">
-            <a:avLst/>
-          </a:prstGeom>
-        </p:spPr>
-        <p:txBody>
-          <a:bodyPr spcFirstLastPara="1" wrap="square" lIns="91425" tIns="91425" rIns="91425" bIns="91425" anchor="t" anchorCtr="0"/>
-          <a:lstStyle>
-            <a:lvl1pPr marL="457200" lvl="0" indent="-381000">
-              <a:spcBef>
-                <a:spcPts val="600"/>
-              </a:spcBef>
-              <a:spcAft>
-                <a:spcPts val="0"/>
-              </a:spcAft>
-              <a:buSzPts val="2400"/>
-              <a:buChar char="▰"/>
-              <a:defRPr sz="1400"/>
-            </a:lvl1pPr>
-            <a:lvl2pPr marL="914400" lvl="1" indent="-381000">
-              <a:spcBef>
-                <a:spcPts val="1000"/>
-              </a:spcBef>
-              <a:spcAft>
-                <a:spcPts val="0"/>
-              </a:spcAft>
-              <a:buSzPts val="2400"/>
-              <a:buChar char="▻"/>
-              <a:defRPr/>
-            </a:lvl2pPr>
-            <a:lvl3pPr marL="1371600" lvl="2" indent="-381000">
-              <a:spcBef>
-                <a:spcPts val="1000"/>
-              </a:spcBef>
-              <a:spcAft>
-                <a:spcPts val="0"/>
-              </a:spcAft>
-              <a:buSzPts val="2400"/>
-              <a:buChar char="▻"/>
-              <a:defRPr/>
-            </a:lvl3pPr>
-            <a:lvl4pPr marL="1828800" lvl="3" indent="-381000">
-              <a:spcBef>
-                <a:spcPts val="1000"/>
-              </a:spcBef>
-              <a:spcAft>
-                <a:spcPts val="0"/>
-              </a:spcAft>
-              <a:buSzPts val="2400"/>
-              <a:buChar char="▻"/>
-              <a:defRPr/>
-            </a:lvl4pPr>
-            <a:lvl5pPr marL="2286000" lvl="4" indent="-381000">
-              <a:spcBef>
-                <a:spcPts val="1000"/>
-              </a:spcBef>
-              <a:spcAft>
-                <a:spcPts val="0"/>
-              </a:spcAft>
-              <a:buSzPts val="2400"/>
-              <a:buChar char="▻"/>
-              <a:defRPr/>
-            </a:lvl5pPr>
-            <a:lvl6pPr marL="2743200" lvl="5" indent="-381000">
-              <a:spcBef>
-                <a:spcPts val="1000"/>
-              </a:spcBef>
-              <a:spcAft>
-                <a:spcPts val="0"/>
-              </a:spcAft>
-              <a:buSzPts val="2400"/>
-              <a:buChar char="▻"/>
-              <a:defRPr/>
-            </a:lvl6pPr>
-            <a:lvl7pPr marL="3200400" lvl="6" indent="-381000">
-              <a:spcBef>
-                <a:spcPts val="1000"/>
-              </a:spcBef>
-              <a:spcAft>
-                <a:spcPts val="0"/>
-              </a:spcAft>
-              <a:buSzPts val="2400"/>
-              <a:buChar char="▻"/>
-              <a:defRPr/>
-            </a:lvl7pPr>
-            <a:lvl8pPr marL="3657600" lvl="7" indent="-381000">
-              <a:spcBef>
-                <a:spcPts val="1000"/>
-              </a:spcBef>
-              <a:spcAft>
-                <a:spcPts val="0"/>
-              </a:spcAft>
-              <a:buSzPts val="2400"/>
-              <a:buChar char="▻"/>
-              <a:defRPr/>
-            </a:lvl8pPr>
-            <a:lvl9pPr marL="4114800" lvl="8" indent="-381000">
-              <a:spcBef>
-                <a:spcPts val="1000"/>
-              </a:spcBef>
-              <a:spcAft>
-                <a:spcPts val="1000"/>
-              </a:spcAft>
-              <a:buSzPts val="2400"/>
-              <a:buChar char="▻"/>
               <a:defRPr/>
             </a:lvl9pPr>
           </a:lstStyle>
@@ -8149,10 +10485,12 @@
     <p:sldLayoutId id="2147483649" r:id="rId2"/>
     <p:sldLayoutId id="2147483651" r:id="rId3"/>
     <p:sldLayoutId id="2147483658" r:id="rId4"/>
-    <p:sldLayoutId id="2147483659" r:id="rId5"/>
-    <p:sldLayoutId id="2147483662" r:id="rId6"/>
-    <p:sldLayoutId id="2147483660" r:id="rId7"/>
-    <p:sldLayoutId id="2147483661" r:id="rId8"/>
+    <p:sldLayoutId id="2147483664" r:id="rId5"/>
+    <p:sldLayoutId id="2147483659" r:id="rId6"/>
+    <p:sldLayoutId id="2147483662" r:id="rId7"/>
+    <p:sldLayoutId id="2147483660" r:id="rId8"/>
+    <p:sldLayoutId id="2147483661" r:id="rId9"/>
+    <p:sldLayoutId id="2147483663" r:id="rId10"/>
   </p:sldLayoutIdLst>
   <p:transition>
     <p:fade thruBlk="1"/>
@@ -9489,7 +11827,12 @@
             <p:ph type="title"/>
           </p:nvPr>
         </p:nvSpPr>
-        <p:spPr/>
+        <p:spPr>
+          <a:xfrm>
+            <a:off x="814275" y="212242"/>
+            <a:ext cx="4118404" cy="337313"/>
+          </a:xfrm>
+        </p:spPr>
         <p:txBody>
           <a:bodyPr/>
           <a:lstStyle/>
@@ -9616,12 +11959,7 @@
             <p:ph type="body" idx="1"/>
           </p:nvPr>
         </p:nvSpPr>
-        <p:spPr>
-          <a:xfrm>
-            <a:off x="814275" y="1584097"/>
-            <a:ext cx="3777034" cy="3062629"/>
-          </a:xfrm>
-        </p:spPr>
+        <p:spPr/>
         <p:txBody>
           <a:bodyPr/>
           <a:lstStyle/>
@@ -9654,6 +11992,56 @@
               <a:rPr lang="en-US" dirty="0"/>
               <a:t> in Java is a part of the Java Runtime Environment(JRE) which is used to load Java classes into the Java Virtual Machine dynamically. It adds security by separating the package for the classes of the local file system from those that are imported from network sources.</a:t>
             </a:r>
+          </a:p>
+        </p:txBody>
+      </p:sp>
+      <p:sp>
+        <p:nvSpPr>
+          <p:cNvPr id="5" name="Text Placeholder 4">
+            <a:extLst>
+              <a:ext uri="{FF2B5EF4-FFF2-40B4-BE49-F238E27FC236}">
+                <a16:creationId xmlns:a16="http://schemas.microsoft.com/office/drawing/2014/main" id="{75081766-0F7B-480B-867D-4FC2EFE4E03F}"/>
+              </a:ext>
+            </a:extLst>
+          </p:cNvPr>
+          <p:cNvSpPr>
+            <a:spLocks noGrp="1"/>
+          </p:cNvSpPr>
+          <p:nvPr>
+            <p:ph type="body" idx="13"/>
+          </p:nvPr>
+        </p:nvSpPr>
+        <p:spPr/>
+        <p:txBody>
+          <a:bodyPr/>
+          <a:lstStyle/>
+          <a:p>
+            <a:r>
+              <a:rPr lang="en-US" dirty="0"/>
+              <a:t>Bytecode Verifier: It checks the code fragments for illegal code that can violate access right to objects.</a:t>
+            </a:r>
+          </a:p>
+          <a:p>
+            <a:r>
+              <a:rPr lang="en-US" dirty="0"/>
+              <a:t>Security Manager: It determines what resources a class can access such as reading and writing to the local disk.</a:t>
+            </a:r>
+          </a:p>
+          <a:p>
+            <a:pPr marL="76200" indent="0">
+              <a:buNone/>
+            </a:pPr>
+            <a:r>
+              <a:rPr lang="en-US" dirty="0"/>
+              <a:t>Java language provides these securities by default. Some security can also be provided by an application developer explicitly through SSL, JAAS, Cryptography, etc.</a:t>
+            </a:r>
+            <a:endParaRPr lang="en-ID" dirty="0"/>
+          </a:p>
+          <a:p>
+            <a:pPr marL="76200" indent="0">
+              <a:buNone/>
+            </a:pPr>
+            <a:endParaRPr lang="en-ID" dirty="0"/>
           </a:p>
         </p:txBody>
       </p:sp>
@@ -9688,10 +12076,10 @@
       </p:sp>
       <p:sp>
         <p:nvSpPr>
-          <p:cNvPr id="5" name="Text Placeholder 4">
-            <a:extLst>
-              <a:ext uri="{FF2B5EF4-FFF2-40B4-BE49-F238E27FC236}">
-                <a16:creationId xmlns:a16="http://schemas.microsoft.com/office/drawing/2014/main" id="{75081766-0F7B-480B-867D-4FC2EFE4E03F}"/>
+          <p:cNvPr id="7" name="Text Placeholder 6">
+            <a:extLst>
+              <a:ext uri="{FF2B5EF4-FFF2-40B4-BE49-F238E27FC236}">
+                <a16:creationId xmlns:a16="http://schemas.microsoft.com/office/drawing/2014/main" id="{8ACE3576-3F2D-4D65-A012-39C900D8A0DF}"/>
               </a:ext>
             </a:extLst>
           </p:cNvPr>
@@ -9699,327 +12087,15 @@
             <a:spLocks noGrp="1"/>
           </p:cNvSpPr>
           <p:nvPr>
-            <p:ph type="body" idx="13"/>
+            <p:ph type="body" idx="14"/>
           </p:nvPr>
         </p:nvSpPr>
-        <p:spPr>
-          <a:xfrm>
-            <a:off x="4683952" y="1584097"/>
-            <a:ext cx="3777034" cy="3062629"/>
-          </a:xfrm>
-        </p:spPr>
+        <p:spPr/>
         <p:txBody>
           <a:bodyPr/>
           <a:lstStyle/>
           <a:p>
-            <a:r>
-              <a:rPr lang="en-US" dirty="0"/>
-              <a:t>Bytecode Verifier: It checks the code fragments for illegal code that can violate access right to objects.</a:t>
-            </a:r>
-          </a:p>
-          <a:p>
-            <a:r>
-              <a:rPr lang="en-US" dirty="0"/>
-              <a:t>Security Manager: It determines what resources a class can access such as reading and writing to the local disk.</a:t>
-            </a:r>
-          </a:p>
-          <a:p>
             <a:pPr marL="76200" indent="0">
-              <a:buNone/>
-            </a:pPr>
-            <a:r>
-              <a:rPr lang="en-US" dirty="0"/>
-              <a:t>Java language provides these securities by default. Some security can also be provided by an application developer explicitly through SSL, JAAS, Cryptography, etc.</a:t>
-            </a:r>
-            <a:endParaRPr lang="en-ID" dirty="0"/>
-          </a:p>
-          <a:p>
-            <a:pPr marL="76200" indent="0">
-              <a:buNone/>
-            </a:pPr>
-            <a:endParaRPr lang="en-ID" dirty="0"/>
-          </a:p>
-        </p:txBody>
-      </p:sp>
-      <p:sp>
-        <p:nvSpPr>
-          <p:cNvPr id="6" name="Text Placeholder 2">
-            <a:extLst>
-              <a:ext uri="{FF2B5EF4-FFF2-40B4-BE49-F238E27FC236}">
-                <a16:creationId xmlns:a16="http://schemas.microsoft.com/office/drawing/2014/main" id="{CF59DAE7-B933-43A7-AEE9-DE88F84BB852}"/>
-              </a:ext>
-            </a:extLst>
-          </p:cNvPr>
-          <p:cNvSpPr txBox="1">
-            <a:spLocks/>
-          </p:cNvSpPr>
-          <p:nvPr/>
-        </p:nvSpPr>
-        <p:spPr>
-          <a:xfrm>
-            <a:off x="814275" y="775208"/>
-            <a:ext cx="7640620" cy="808889"/>
-          </a:xfrm>
-          <a:prstGeom prst="rect">
-            <a:avLst/>
-          </a:prstGeom>
-          <a:noFill/>
-          <a:ln>
-            <a:noFill/>
-          </a:ln>
-        </p:spPr>
-        <p:txBody>
-          <a:bodyPr spcFirstLastPara="1" wrap="square" lIns="91425" tIns="91425" rIns="91425" bIns="91425" anchor="t" anchorCtr="0"/>
-          <a:lstStyle>
-            <a:defPPr marR="0" lvl="0" algn="l" rtl="0">
-              <a:lnSpc>
-                <a:spcPct val="100000"/>
-              </a:lnSpc>
-              <a:spcBef>
-                <a:spcPts val="0"/>
-              </a:spcBef>
-              <a:spcAft>
-                <a:spcPts val="0"/>
-              </a:spcAft>
-            </a:defPPr>
-            <a:lvl1pPr marL="457200" marR="0" lvl="0" indent="-381000" algn="l" rtl="0">
-              <a:lnSpc>
-                <a:spcPct val="100000"/>
-              </a:lnSpc>
-              <a:spcBef>
-                <a:spcPts val="600"/>
-              </a:spcBef>
-              <a:spcAft>
-                <a:spcPts val="0"/>
-              </a:spcAft>
-              <a:buClr>
-                <a:srgbClr val="C7D3E6"/>
-              </a:buClr>
-              <a:buSzPts val="2400"/>
-              <a:buFont typeface="Roboto Condensed Light"/>
-              <a:buChar char="▰"/>
-              <a:defRPr sz="1400" b="0" i="0" u="none" strike="noStrike" cap="none">
-                <a:solidFill>
-                  <a:srgbClr val="263248"/>
-                </a:solidFill>
-                <a:latin typeface="Roboto Condensed Light"/>
-                <a:ea typeface="Roboto Condensed Light"/>
-                <a:cs typeface="Roboto Condensed Light"/>
-                <a:sym typeface="Roboto Condensed Light"/>
-              </a:defRPr>
-            </a:lvl1pPr>
-            <a:lvl2pPr marL="914400" marR="0" lvl="1" indent="-381000" algn="l" rtl="0">
-              <a:lnSpc>
-                <a:spcPct val="100000"/>
-              </a:lnSpc>
-              <a:spcBef>
-                <a:spcPts val="1000"/>
-              </a:spcBef>
-              <a:spcAft>
-                <a:spcPts val="0"/>
-              </a:spcAft>
-              <a:buClr>
-                <a:srgbClr val="C7D3E6"/>
-              </a:buClr>
-              <a:buSzPts val="2400"/>
-              <a:buFont typeface="Roboto Condensed Light"/>
-              <a:buChar char="▻"/>
-              <a:defRPr sz="2400" b="0" i="0" u="none" strike="noStrike" cap="none">
-                <a:solidFill>
-                  <a:srgbClr val="263248"/>
-                </a:solidFill>
-                <a:latin typeface="Roboto Condensed Light"/>
-                <a:ea typeface="Roboto Condensed Light"/>
-                <a:cs typeface="Roboto Condensed Light"/>
-                <a:sym typeface="Roboto Condensed Light"/>
-              </a:defRPr>
-            </a:lvl2pPr>
-            <a:lvl3pPr marL="1371600" marR="0" lvl="2" indent="-381000" algn="l" rtl="0">
-              <a:lnSpc>
-                <a:spcPct val="100000"/>
-              </a:lnSpc>
-              <a:spcBef>
-                <a:spcPts val="1000"/>
-              </a:spcBef>
-              <a:spcAft>
-                <a:spcPts val="0"/>
-              </a:spcAft>
-              <a:buClr>
-                <a:srgbClr val="C7D3E6"/>
-              </a:buClr>
-              <a:buSzPts val="2400"/>
-              <a:buFont typeface="Roboto Condensed Light"/>
-              <a:buChar char="▻"/>
-              <a:defRPr sz="2400" b="0" i="0" u="none" strike="noStrike" cap="none">
-                <a:solidFill>
-                  <a:srgbClr val="263248"/>
-                </a:solidFill>
-                <a:latin typeface="Roboto Condensed Light"/>
-                <a:ea typeface="Roboto Condensed Light"/>
-                <a:cs typeface="Roboto Condensed Light"/>
-                <a:sym typeface="Roboto Condensed Light"/>
-              </a:defRPr>
-            </a:lvl3pPr>
-            <a:lvl4pPr marL="1828800" marR="0" lvl="3" indent="-381000" algn="l" rtl="0">
-              <a:lnSpc>
-                <a:spcPct val="100000"/>
-              </a:lnSpc>
-              <a:spcBef>
-                <a:spcPts val="1000"/>
-              </a:spcBef>
-              <a:spcAft>
-                <a:spcPts val="0"/>
-              </a:spcAft>
-              <a:buClr>
-                <a:srgbClr val="C7D3E6"/>
-              </a:buClr>
-              <a:buSzPts val="2400"/>
-              <a:buFont typeface="Roboto Condensed Light"/>
-              <a:buChar char="▻"/>
-              <a:defRPr sz="2400" b="0" i="0" u="none" strike="noStrike" cap="none">
-                <a:solidFill>
-                  <a:srgbClr val="263248"/>
-                </a:solidFill>
-                <a:latin typeface="Roboto Condensed Light"/>
-                <a:ea typeface="Roboto Condensed Light"/>
-                <a:cs typeface="Roboto Condensed Light"/>
-                <a:sym typeface="Roboto Condensed Light"/>
-              </a:defRPr>
-            </a:lvl4pPr>
-            <a:lvl5pPr marL="2286000" marR="0" lvl="4" indent="-381000" algn="l" rtl="0">
-              <a:lnSpc>
-                <a:spcPct val="100000"/>
-              </a:lnSpc>
-              <a:spcBef>
-                <a:spcPts val="1000"/>
-              </a:spcBef>
-              <a:spcAft>
-                <a:spcPts val="0"/>
-              </a:spcAft>
-              <a:buClr>
-                <a:srgbClr val="C7D3E6"/>
-              </a:buClr>
-              <a:buSzPts val="2400"/>
-              <a:buFont typeface="Roboto Condensed Light"/>
-              <a:buChar char="▻"/>
-              <a:defRPr sz="2400" b="0" i="0" u="none" strike="noStrike" cap="none">
-                <a:solidFill>
-                  <a:srgbClr val="263248"/>
-                </a:solidFill>
-                <a:latin typeface="Roboto Condensed Light"/>
-                <a:ea typeface="Roboto Condensed Light"/>
-                <a:cs typeface="Roboto Condensed Light"/>
-                <a:sym typeface="Roboto Condensed Light"/>
-              </a:defRPr>
-            </a:lvl5pPr>
-            <a:lvl6pPr marL="2743200" marR="0" lvl="5" indent="-381000" algn="l" rtl="0">
-              <a:lnSpc>
-                <a:spcPct val="100000"/>
-              </a:lnSpc>
-              <a:spcBef>
-                <a:spcPts val="1000"/>
-              </a:spcBef>
-              <a:spcAft>
-                <a:spcPts val="0"/>
-              </a:spcAft>
-              <a:buClr>
-                <a:srgbClr val="C7D3E6"/>
-              </a:buClr>
-              <a:buSzPts val="2400"/>
-              <a:buFont typeface="Roboto Condensed Light"/>
-              <a:buChar char="▻"/>
-              <a:defRPr sz="2400" b="0" i="0" u="none" strike="noStrike" cap="none">
-                <a:solidFill>
-                  <a:srgbClr val="263248"/>
-                </a:solidFill>
-                <a:latin typeface="Roboto Condensed Light"/>
-                <a:ea typeface="Roboto Condensed Light"/>
-                <a:cs typeface="Roboto Condensed Light"/>
-                <a:sym typeface="Roboto Condensed Light"/>
-              </a:defRPr>
-            </a:lvl6pPr>
-            <a:lvl7pPr marL="3200400" marR="0" lvl="6" indent="-381000" algn="l" rtl="0">
-              <a:lnSpc>
-                <a:spcPct val="100000"/>
-              </a:lnSpc>
-              <a:spcBef>
-                <a:spcPts val="1000"/>
-              </a:spcBef>
-              <a:spcAft>
-                <a:spcPts val="0"/>
-              </a:spcAft>
-              <a:buClr>
-                <a:srgbClr val="C7D3E6"/>
-              </a:buClr>
-              <a:buSzPts val="2400"/>
-              <a:buFont typeface="Roboto Condensed Light"/>
-              <a:buChar char="▻"/>
-              <a:defRPr sz="2400" b="0" i="0" u="none" strike="noStrike" cap="none">
-                <a:solidFill>
-                  <a:srgbClr val="263248"/>
-                </a:solidFill>
-                <a:latin typeface="Roboto Condensed Light"/>
-                <a:ea typeface="Roboto Condensed Light"/>
-                <a:cs typeface="Roboto Condensed Light"/>
-                <a:sym typeface="Roboto Condensed Light"/>
-              </a:defRPr>
-            </a:lvl7pPr>
-            <a:lvl8pPr marL="3657600" marR="0" lvl="7" indent="-381000" algn="l" rtl="0">
-              <a:lnSpc>
-                <a:spcPct val="100000"/>
-              </a:lnSpc>
-              <a:spcBef>
-                <a:spcPts val="1000"/>
-              </a:spcBef>
-              <a:spcAft>
-                <a:spcPts val="0"/>
-              </a:spcAft>
-              <a:buClr>
-                <a:srgbClr val="C7D3E6"/>
-              </a:buClr>
-              <a:buSzPts val="2400"/>
-              <a:buFont typeface="Roboto Condensed Light"/>
-              <a:buChar char="▻"/>
-              <a:defRPr sz="2400" b="0" i="0" u="none" strike="noStrike" cap="none">
-                <a:solidFill>
-                  <a:srgbClr val="263248"/>
-                </a:solidFill>
-                <a:latin typeface="Roboto Condensed Light"/>
-                <a:ea typeface="Roboto Condensed Light"/>
-                <a:cs typeface="Roboto Condensed Light"/>
-                <a:sym typeface="Roboto Condensed Light"/>
-              </a:defRPr>
-            </a:lvl8pPr>
-            <a:lvl9pPr marL="4114800" marR="0" lvl="8" indent="-381000" algn="l" rtl="0">
-              <a:lnSpc>
-                <a:spcPct val="100000"/>
-              </a:lnSpc>
-              <a:spcBef>
-                <a:spcPts val="1000"/>
-              </a:spcBef>
-              <a:spcAft>
-                <a:spcPts val="1000"/>
-              </a:spcAft>
-              <a:buClr>
-                <a:srgbClr val="C7D3E6"/>
-              </a:buClr>
-              <a:buSzPts val="2400"/>
-              <a:buFont typeface="Roboto Condensed Light"/>
-              <a:buChar char="▻"/>
-              <a:defRPr sz="2400" b="0" i="0" u="none" strike="noStrike" cap="none">
-                <a:solidFill>
-                  <a:srgbClr val="263248"/>
-                </a:solidFill>
-                <a:latin typeface="Roboto Condensed Light"/>
-                <a:ea typeface="Roboto Condensed Light"/>
-                <a:cs typeface="Roboto Condensed Light"/>
-                <a:sym typeface="Roboto Condensed Light"/>
-              </a:defRPr>
-            </a:lvl9pPr>
-          </a:lstStyle>
-          <a:p>
-            <a:pPr marL="76200" indent="0">
-              <a:buFont typeface="Roboto Condensed Light"/>
               <a:buNone/>
             </a:pPr>
             <a:r>
@@ -10030,7 +12106,6 @@
           </a:p>
           <a:p>
             <a:pPr marL="76200" indent="0">
-              <a:buFont typeface="Roboto Condensed Light"/>
               <a:buNone/>
             </a:pPr>
             <a:r>
@@ -10317,7 +12392,12 @@
             <p:ph type="title"/>
           </p:nvPr>
         </p:nvSpPr>
-        <p:spPr/>
+        <p:spPr>
+          <a:xfrm>
+            <a:off x="814275" y="212242"/>
+            <a:ext cx="4118404" cy="337313"/>
+          </a:xfrm>
+        </p:spPr>
         <p:txBody>
           <a:bodyPr/>
           <a:lstStyle/>
@@ -10491,7 +12571,12 @@
             <p:ph type="title"/>
           </p:nvPr>
         </p:nvSpPr>
-        <p:spPr/>
+        <p:spPr>
+          <a:xfrm>
+            <a:off x="814275" y="212242"/>
+            <a:ext cx="4118404" cy="337313"/>
+          </a:xfrm>
+        </p:spPr>
         <p:txBody>
           <a:bodyPr/>
           <a:lstStyle/>
@@ -10665,7 +12750,12 @@
             <p:ph type="title"/>
           </p:nvPr>
         </p:nvSpPr>
-        <p:spPr/>
+        <p:spPr>
+          <a:xfrm>
+            <a:off x="814275" y="212242"/>
+            <a:ext cx="4118404" cy="337313"/>
+          </a:xfrm>
+        </p:spPr>
         <p:txBody>
           <a:bodyPr/>
           <a:lstStyle/>
@@ -11033,7 +13123,12 @@
             <p:ph type="title"/>
           </p:nvPr>
         </p:nvSpPr>
-        <p:spPr/>
+        <p:spPr>
+          <a:xfrm>
+            <a:off x="814275" y="212242"/>
+            <a:ext cx="4118404" cy="337313"/>
+          </a:xfrm>
+        </p:spPr>
         <p:txBody>
           <a:bodyPr/>
           <a:lstStyle/>
@@ -11355,7 +13450,12 @@
             <p:ph type="title"/>
           </p:nvPr>
         </p:nvSpPr>
-        <p:spPr/>
+        <p:spPr>
+          <a:xfrm>
+            <a:off x="814275" y="212242"/>
+            <a:ext cx="4118404" cy="337313"/>
+          </a:xfrm>
+        </p:spPr>
         <p:txBody>
           <a:bodyPr/>
           <a:lstStyle/>
@@ -11565,7 +13665,12 @@
             <p:ph type="title"/>
           </p:nvPr>
         </p:nvSpPr>
-        <p:spPr/>
+        <p:spPr>
+          <a:xfrm>
+            <a:off x="814275" y="212242"/>
+            <a:ext cx="4118404" cy="337313"/>
+          </a:xfrm>
+        </p:spPr>
         <p:txBody>
           <a:bodyPr/>
           <a:lstStyle/>
@@ -13386,7 +15491,12 @@
             <p:ph type="title"/>
           </p:nvPr>
         </p:nvSpPr>
-        <p:spPr/>
+        <p:spPr>
+          <a:xfrm>
+            <a:off x="814275" y="212242"/>
+            <a:ext cx="4118404" cy="337313"/>
+          </a:xfrm>
+        </p:spPr>
         <p:txBody>
           <a:bodyPr/>
           <a:lstStyle/>
@@ -13754,7 +15864,12 @@
             <p:ph type="title"/>
           </p:nvPr>
         </p:nvSpPr>
-        <p:spPr/>
+        <p:spPr>
+          <a:xfrm>
+            <a:off x="814275" y="212242"/>
+            <a:ext cx="4118404" cy="337313"/>
+          </a:xfrm>
+        </p:spPr>
         <p:txBody>
           <a:bodyPr/>
           <a:lstStyle/>
@@ -13955,7 +16070,12 @@
             <p:ph type="title"/>
           </p:nvPr>
         </p:nvSpPr>
-        <p:spPr/>
+        <p:spPr>
+          <a:xfrm>
+            <a:off x="814275" y="212242"/>
+            <a:ext cx="4118404" cy="337313"/>
+          </a:xfrm>
+        </p:spPr>
         <p:txBody>
           <a:bodyPr/>
           <a:lstStyle/>
@@ -14052,7 +16172,12 @@
             <p:ph type="title"/>
           </p:nvPr>
         </p:nvSpPr>
-        <p:spPr/>
+        <p:spPr>
+          <a:xfrm>
+            <a:off x="814275" y="212242"/>
+            <a:ext cx="4118404" cy="337313"/>
+          </a:xfrm>
+        </p:spPr>
         <p:txBody>
           <a:bodyPr/>
           <a:lstStyle/>
@@ -14179,7 +16304,12 @@
             <p:ph type="title"/>
           </p:nvPr>
         </p:nvSpPr>
-        <p:spPr/>
+        <p:spPr>
+          <a:xfrm>
+            <a:off x="814275" y="212242"/>
+            <a:ext cx="4118404" cy="337313"/>
+          </a:xfrm>
+        </p:spPr>
         <p:txBody>
           <a:bodyPr/>
           <a:lstStyle/>
@@ -14306,7 +16436,12 @@
             <p:ph type="title"/>
           </p:nvPr>
         </p:nvSpPr>
-        <p:spPr/>
+        <p:spPr>
+          <a:xfrm>
+            <a:off x="814275" y="212242"/>
+            <a:ext cx="4118404" cy="337313"/>
+          </a:xfrm>
+        </p:spPr>
         <p:txBody>
           <a:bodyPr/>
           <a:lstStyle/>
@@ -14433,7 +16568,12 @@
             <p:ph type="title"/>
           </p:nvPr>
         </p:nvSpPr>
-        <p:spPr/>
+        <p:spPr>
+          <a:xfrm>
+            <a:off x="814275" y="212242"/>
+            <a:ext cx="4118404" cy="337313"/>
+          </a:xfrm>
+        </p:spPr>
         <p:txBody>
           <a:bodyPr/>
           <a:lstStyle/>
@@ -14560,7 +16700,12 @@
             <p:ph type="title"/>
           </p:nvPr>
         </p:nvSpPr>
-        <p:spPr/>
+        <p:spPr>
+          <a:xfrm>
+            <a:off x="814275" y="212242"/>
+            <a:ext cx="4118404" cy="337313"/>
+          </a:xfrm>
+        </p:spPr>
         <p:txBody>
           <a:bodyPr/>
           <a:lstStyle/>
@@ -14687,7 +16832,12 @@
             <p:ph type="title"/>
           </p:nvPr>
         </p:nvSpPr>
-        <p:spPr/>
+        <p:spPr>
+          <a:xfrm>
+            <a:off x="814275" y="212242"/>
+            <a:ext cx="4118404" cy="337313"/>
+          </a:xfrm>
+        </p:spPr>
         <p:txBody>
           <a:bodyPr/>
           <a:lstStyle/>
@@ -14843,7 +16993,12 @@
             <p:ph type="title"/>
           </p:nvPr>
         </p:nvSpPr>
-        <p:spPr/>
+        <p:spPr>
+          <a:xfrm>
+            <a:off x="814275" y="212242"/>
+            <a:ext cx="4118404" cy="337313"/>
+          </a:xfrm>
+        </p:spPr>
         <p:txBody>
           <a:bodyPr/>
           <a:lstStyle/>
@@ -15049,7 +17204,12 @@
             <p:ph type="title"/>
           </p:nvPr>
         </p:nvSpPr>
-        <p:spPr/>
+        <p:spPr>
+          <a:xfrm>
+            <a:off x="814275" y="212242"/>
+            <a:ext cx="4118404" cy="337313"/>
+          </a:xfrm>
+        </p:spPr>
         <p:txBody>
           <a:bodyPr/>
           <a:lstStyle/>
@@ -15365,7 +17525,12 @@
             <p:ph type="title"/>
           </p:nvPr>
         </p:nvSpPr>
-        <p:spPr/>
+        <p:spPr>
+          <a:xfrm>
+            <a:off x="814275" y="212242"/>
+            <a:ext cx="4118404" cy="337313"/>
+          </a:xfrm>
+        </p:spPr>
         <p:txBody>
           <a:bodyPr/>
           <a:lstStyle/>
@@ -15553,7 +17718,12 @@
             <p:ph type="title"/>
           </p:nvPr>
         </p:nvSpPr>
-        <p:spPr/>
+        <p:spPr>
+          <a:xfrm>
+            <a:off x="814275" y="212242"/>
+            <a:ext cx="4118404" cy="337313"/>
+          </a:xfrm>
+        </p:spPr>
         <p:txBody>
           <a:bodyPr/>
           <a:lstStyle/>
@@ -15757,7 +17927,12 @@
             <p:ph type="title"/>
           </p:nvPr>
         </p:nvSpPr>
-        <p:spPr/>
+        <p:spPr>
+          <a:xfrm>
+            <a:off x="814275" y="212242"/>
+            <a:ext cx="4118404" cy="337313"/>
+          </a:xfrm>
+        </p:spPr>
         <p:txBody>
           <a:bodyPr/>
           <a:lstStyle/>
@@ -15892,7 +18067,12 @@
             <p:ph type="title"/>
           </p:nvPr>
         </p:nvSpPr>
-        <p:spPr/>
+        <p:spPr>
+          <a:xfrm>
+            <a:off x="814275" y="212242"/>
+            <a:ext cx="4118404" cy="337313"/>
+          </a:xfrm>
+        </p:spPr>
         <p:txBody>
           <a:bodyPr/>
           <a:lstStyle/>
@@ -16269,7 +18449,12 @@
             <p:ph type="title"/>
           </p:nvPr>
         </p:nvSpPr>
-        <p:spPr/>
+        <p:spPr>
+          <a:xfrm>
+            <a:off x="814275" y="212242"/>
+            <a:ext cx="4118404" cy="337313"/>
+          </a:xfrm>
+        </p:spPr>
         <p:txBody>
           <a:bodyPr/>
           <a:lstStyle/>
@@ -16488,7 +18673,12 @@
             <p:ph type="title"/>
           </p:nvPr>
         </p:nvSpPr>
-        <p:spPr/>
+        <p:spPr>
+          <a:xfrm>
+            <a:off x="814275" y="212242"/>
+            <a:ext cx="4118404" cy="337313"/>
+          </a:xfrm>
+        </p:spPr>
         <p:txBody>
           <a:bodyPr/>
           <a:lstStyle/>
@@ -16671,7 +18861,12 @@
             <p:ph type="title"/>
           </p:nvPr>
         </p:nvSpPr>
-        <p:spPr/>
+        <p:spPr>
+          <a:xfrm>
+            <a:off x="814275" y="212242"/>
+            <a:ext cx="4118404" cy="337313"/>
+          </a:xfrm>
+        </p:spPr>
         <p:txBody>
           <a:bodyPr/>
           <a:lstStyle/>
@@ -16852,7 +19047,12 @@
             <p:ph type="title"/>
           </p:nvPr>
         </p:nvSpPr>
-        <p:spPr/>
+        <p:spPr>
+          <a:xfrm>
+            <a:off x="814275" y="212242"/>
+            <a:ext cx="4118404" cy="337313"/>
+          </a:xfrm>
+        </p:spPr>
         <p:txBody>
           <a:bodyPr/>
           <a:lstStyle/>
@@ -17002,7 +19202,12 @@
             <p:ph type="title"/>
           </p:nvPr>
         </p:nvSpPr>
-        <p:spPr/>
+        <p:spPr>
+          <a:xfrm>
+            <a:off x="814275" y="212242"/>
+            <a:ext cx="4118404" cy="337313"/>
+          </a:xfrm>
+        </p:spPr>
         <p:txBody>
           <a:bodyPr/>
           <a:lstStyle/>
@@ -17226,7 +19431,12 @@
             <p:ph type="title"/>
           </p:nvPr>
         </p:nvSpPr>
-        <p:spPr/>
+        <p:spPr>
+          <a:xfrm>
+            <a:off x="814275" y="212242"/>
+            <a:ext cx="4118404" cy="337313"/>
+          </a:xfrm>
+        </p:spPr>
         <p:txBody>
           <a:bodyPr/>
           <a:lstStyle/>
@@ -17440,7 +19650,12 @@
             <p:ph type="title"/>
           </p:nvPr>
         </p:nvSpPr>
-        <p:spPr/>
+        <p:spPr>
+          <a:xfrm>
+            <a:off x="814275" y="212242"/>
+            <a:ext cx="4118404" cy="337313"/>
+          </a:xfrm>
+        </p:spPr>
         <p:txBody>
           <a:bodyPr/>
           <a:lstStyle/>
@@ -17598,7 +19813,12 @@
             <p:ph type="title"/>
           </p:nvPr>
         </p:nvSpPr>
-        <p:spPr/>
+        <p:spPr>
+          <a:xfrm>
+            <a:off x="814275" y="212242"/>
+            <a:ext cx="4118404" cy="337313"/>
+          </a:xfrm>
+        </p:spPr>
         <p:txBody>
           <a:bodyPr/>
           <a:lstStyle/>
@@ -17954,7 +20174,12 @@
             <p:ph type="title"/>
           </p:nvPr>
         </p:nvSpPr>
-        <p:spPr/>
+        <p:spPr>
+          <a:xfrm>
+            <a:off x="814275" y="212242"/>
+            <a:ext cx="4118404" cy="337313"/>
+          </a:xfrm>
+        </p:spPr>
         <p:txBody>
           <a:bodyPr/>
           <a:lstStyle/>
@@ -18080,7 +20305,12 @@
             <p:ph type="title"/>
           </p:nvPr>
         </p:nvSpPr>
-        <p:spPr/>
+        <p:spPr>
+          <a:xfrm>
+            <a:off x="814275" y="212242"/>
+            <a:ext cx="4118404" cy="337313"/>
+          </a:xfrm>
+        </p:spPr>
         <p:txBody>
           <a:bodyPr/>
           <a:lstStyle/>
@@ -18236,7 +20466,12 @@
             <p:ph type="title"/>
           </p:nvPr>
         </p:nvSpPr>
-        <p:spPr/>
+        <p:spPr>
+          <a:xfrm>
+            <a:off x="814275" y="212242"/>
+            <a:ext cx="4118404" cy="337313"/>
+          </a:xfrm>
+        </p:spPr>
         <p:txBody>
           <a:bodyPr/>
           <a:lstStyle/>
@@ -18451,7 +20686,12 @@
             <p:ph type="title"/>
           </p:nvPr>
         </p:nvSpPr>
-        <p:spPr/>
+        <p:spPr>
+          <a:xfrm>
+            <a:off x="814275" y="212242"/>
+            <a:ext cx="4118404" cy="337313"/>
+          </a:xfrm>
+        </p:spPr>
         <p:txBody>
           <a:bodyPr/>
           <a:lstStyle/>
@@ -18606,7 +20846,12 @@
             <p:ph type="title"/>
           </p:nvPr>
         </p:nvSpPr>
-        <p:spPr/>
+        <p:spPr>
+          <a:xfrm>
+            <a:off x="814275" y="212242"/>
+            <a:ext cx="4118404" cy="337313"/>
+          </a:xfrm>
+        </p:spPr>
         <p:txBody>
           <a:bodyPr/>
           <a:lstStyle/>
@@ -18916,7 +21161,12 @@
             <p:ph type="title"/>
           </p:nvPr>
         </p:nvSpPr>
-        <p:spPr/>
+        <p:spPr>
+          <a:xfrm>
+            <a:off x="814275" y="212242"/>
+            <a:ext cx="4118404" cy="337313"/>
+          </a:xfrm>
+        </p:spPr>
         <p:txBody>
           <a:bodyPr/>
           <a:lstStyle/>
@@ -19096,7 +21346,12 @@
             <p:ph type="title"/>
           </p:nvPr>
         </p:nvSpPr>
-        <p:spPr/>
+        <p:spPr>
+          <a:xfrm>
+            <a:off x="814275" y="212242"/>
+            <a:ext cx="4118404" cy="337313"/>
+          </a:xfrm>
+        </p:spPr>
         <p:txBody>
           <a:bodyPr/>
           <a:lstStyle/>
@@ -19244,7 +21499,12 @@
             <p:ph type="title"/>
           </p:nvPr>
         </p:nvSpPr>
-        <p:spPr/>
+        <p:spPr>
+          <a:xfrm>
+            <a:off x="814275" y="212242"/>
+            <a:ext cx="4118404" cy="337313"/>
+          </a:xfrm>
+        </p:spPr>
         <p:txBody>
           <a:bodyPr/>
           <a:lstStyle/>
@@ -19399,7 +21659,12 @@
             <p:ph type="title"/>
           </p:nvPr>
         </p:nvSpPr>
-        <p:spPr/>
+        <p:spPr>
+          <a:xfrm>
+            <a:off x="814275" y="212242"/>
+            <a:ext cx="4118404" cy="337313"/>
+          </a:xfrm>
+        </p:spPr>
         <p:txBody>
           <a:bodyPr/>
           <a:lstStyle/>
@@ -19619,7 +21884,12 @@
             <p:ph type="title"/>
           </p:nvPr>
         </p:nvSpPr>
-        <p:spPr/>
+        <p:spPr>
+          <a:xfrm>
+            <a:off x="814275" y="212242"/>
+            <a:ext cx="4118404" cy="337313"/>
+          </a:xfrm>
+        </p:spPr>
         <p:txBody>
           <a:bodyPr/>
           <a:lstStyle/>
@@ -19775,7 +22045,12 @@
             <p:ph type="title"/>
           </p:nvPr>
         </p:nvSpPr>
-        <p:spPr/>
+        <p:spPr>
+          <a:xfrm>
+            <a:off x="814275" y="212242"/>
+            <a:ext cx="4118404" cy="337313"/>
+          </a:xfrm>
+        </p:spPr>
         <p:txBody>
           <a:bodyPr/>
           <a:lstStyle/>
@@ -19966,7 +22241,12 @@
             <p:ph type="title"/>
           </p:nvPr>
         </p:nvSpPr>
-        <p:spPr/>
+        <p:spPr>
+          <a:xfrm>
+            <a:off x="814275" y="212242"/>
+            <a:ext cx="4118404" cy="337313"/>
+          </a:xfrm>
+        </p:spPr>
         <p:txBody>
           <a:bodyPr/>
           <a:lstStyle/>
@@ -20201,7 +22481,12 @@
             <p:ph type="title"/>
           </p:nvPr>
         </p:nvSpPr>
-        <p:spPr/>
+        <p:spPr>
+          <a:xfrm>
+            <a:off x="814275" y="212242"/>
+            <a:ext cx="4118404" cy="337313"/>
+          </a:xfrm>
+        </p:spPr>
         <p:txBody>
           <a:bodyPr/>
           <a:lstStyle/>
@@ -20424,7 +22709,12 @@
             <p:ph type="title"/>
           </p:nvPr>
         </p:nvSpPr>
-        <p:spPr/>
+        <p:spPr>
+          <a:xfrm>
+            <a:off x="814275" y="212242"/>
+            <a:ext cx="4118404" cy="337313"/>
+          </a:xfrm>
+        </p:spPr>
         <p:txBody>
           <a:bodyPr/>
           <a:lstStyle/>
@@ -20520,7 +22810,12 @@
             <p:ph type="title"/>
           </p:nvPr>
         </p:nvSpPr>
-        <p:spPr/>
+        <p:spPr>
+          <a:xfrm>
+            <a:off x="814275" y="212242"/>
+            <a:ext cx="4118404" cy="337313"/>
+          </a:xfrm>
+        </p:spPr>
         <p:txBody>
           <a:bodyPr/>
           <a:lstStyle/>

</xml_diff>